<commit_message>
added models of applicants and branches
</commit_message>
<xml_diff>
--- a/Presentations/Занятие 3.pptx
+++ b/Presentations/Занятие 3.pptx
@@ -5,7 +5,7 @@
     <p:sldMasterId id="2147483648" r:id="rId1"/>
   </p:sldMasterIdLst>
   <p:notesMasterIdLst>
-    <p:notesMasterId r:id="rId13"/>
+    <p:notesMasterId r:id="rId25"/>
   </p:notesMasterIdLst>
   <p:sldIdLst>
     <p:sldId id="256" r:id="rId2"/>
@@ -17,8 +17,20 @@
     <p:sldId id="268" r:id="rId8"/>
     <p:sldId id="261" r:id="rId9"/>
     <p:sldId id="269" r:id="rId10"/>
-    <p:sldId id="262" r:id="rId11"/>
-    <p:sldId id="263" r:id="rId12"/>
+    <p:sldId id="263" r:id="rId11"/>
+    <p:sldId id="262" r:id="rId12"/>
+    <p:sldId id="264" r:id="rId13"/>
+    <p:sldId id="265" r:id="rId14"/>
+    <p:sldId id="274" r:id="rId15"/>
+    <p:sldId id="266" r:id="rId16"/>
+    <p:sldId id="270" r:id="rId17"/>
+    <p:sldId id="273" r:id="rId18"/>
+    <p:sldId id="271" r:id="rId19"/>
+    <p:sldId id="276" r:id="rId20"/>
+    <p:sldId id="272" r:id="rId21"/>
+    <p:sldId id="277" r:id="rId22"/>
+    <p:sldId id="275" r:id="rId23"/>
+    <p:sldId id="278" r:id="rId24"/>
   </p:sldIdLst>
   <p:sldSz cx="12192000" cy="6858000"/>
   <p:notesSz cx="6858000" cy="9144000"/>
@@ -650,7 +662,7 @@
           <a:p>
             <a:fld id="{8F6A3D4D-7E3A-4755-99AC-75200A9386BA}" type="slidenum">
               <a:rPr lang="en-GB" smtClean="0"/>
-              <a:t>4</a:t>
+              <a:t>9</a:t>
             </a:fld>
             <a:endParaRPr lang="en-GB"/>
           </a:p>
@@ -659,7 +671,7 @@
     </p:spTree>
     <p:extLst>
       <p:ext uri="{BB962C8B-B14F-4D97-AF65-F5344CB8AC3E}">
-        <p14:creationId xmlns:p14="http://schemas.microsoft.com/office/powerpoint/2010/main" val="495849552"/>
+        <p14:creationId xmlns:p14="http://schemas.microsoft.com/office/powerpoint/2010/main" val="2682439776"/>
       </p:ext>
     </p:extLst>
   </p:cSld>
@@ -734,7 +746,7 @@
           <a:p>
             <a:fld id="{8F6A3D4D-7E3A-4755-99AC-75200A9386BA}" type="slidenum">
               <a:rPr lang="en-GB" smtClean="0"/>
-              <a:t>10</a:t>
+              <a:t>11</a:t>
             </a:fld>
             <a:endParaRPr lang="en-GB"/>
           </a:p>
@@ -3680,7 +3692,7 @@
             </a:r>
             <a:r>
               <a:rPr lang="ru-RU" smtClean="0"/>
-              <a:t>3</a:t>
+              <a:t>2</a:t>
             </a:r>
             <a:endParaRPr lang="en-GB" dirty="0"/>
           </a:p>
@@ -3702,8 +3714,20 @@
           <a:lstStyle/>
           <a:p>
             <a:r>
+              <a:rPr lang="ru-RU" dirty="0" smtClean="0"/>
+              <a:t>Разработка веб </a:t>
+            </a:r>
+            <a:r>
+              <a:rPr lang="ru-RU" dirty="0" err="1" smtClean="0"/>
+              <a:t>приложния</a:t>
+            </a:r>
+            <a:r>
+              <a:rPr lang="ru-RU" dirty="0" smtClean="0"/>
+              <a:t> на </a:t>
+            </a:r>
+            <a:r>
               <a:rPr lang="en-US" dirty="0" smtClean="0"/>
-              <a:t>Entity Framework </a:t>
+              <a:t>ASP.net </a:t>
             </a:r>
             <a:r>
               <a:rPr lang="ru-RU" dirty="0" smtClean="0"/>
@@ -3758,25 +3782,6 @@
       </p:grpSpPr>
       <p:sp>
         <p:nvSpPr>
-          <p:cNvPr id="2" name="Заголовок 1"/>
-          <p:cNvSpPr>
-            <a:spLocks noGrp="1"/>
-          </p:cNvSpPr>
-          <p:nvPr>
-            <p:ph type="title"/>
-          </p:nvPr>
-        </p:nvSpPr>
-        <p:spPr/>
-        <p:txBody>
-          <a:bodyPr/>
-          <a:lstStyle/>
-          <a:p>
-            <a:endParaRPr lang="en-GB" dirty="0"/>
-          </a:p>
-        </p:txBody>
-      </p:sp>
-      <p:sp>
-        <p:nvSpPr>
           <p:cNvPr id="3" name="Объект 2"/>
           <p:cNvSpPr>
             <a:spLocks noGrp="1"/>
@@ -3785,10 +3790,151 @@
             <p:ph idx="1"/>
           </p:nvPr>
         </p:nvSpPr>
-        <p:spPr/>
-        <p:txBody>
-          <a:bodyPr/>
-          <a:lstStyle/>
+        <p:spPr>
+          <a:xfrm>
+            <a:off x="838200" y="772333"/>
+            <a:ext cx="10515600" cy="5108017"/>
+          </a:xfrm>
+        </p:spPr>
+        <p:txBody>
+          <a:bodyPr>
+            <a:normAutofit/>
+          </a:bodyPr>
+          <a:lstStyle/>
+          <a:p>
+            <a:r>
+              <a:rPr lang="ru-RU" dirty="0" smtClean="0"/>
+              <a:t>Запустите </a:t>
+            </a:r>
+            <a:r>
+              <a:rPr lang="en-US" dirty="0" smtClean="0"/>
+              <a:t>Microsoft Visual Studio 2013 </a:t>
+            </a:r>
+          </a:p>
+          <a:p>
+            <a:r>
+              <a:rPr lang="en-US" dirty="0" smtClean="0"/>
+              <a:t>FILE-&gt;New-&gt;Project</a:t>
+            </a:r>
+          </a:p>
+          <a:p>
+            <a:r>
+              <a:rPr lang="en-US" dirty="0" smtClean="0"/>
+              <a:t>Installed-&gt;Templates-&gt;Visual C#  </a:t>
+            </a:r>
+            <a:r>
+              <a:rPr lang="ru-RU" dirty="0" smtClean="0"/>
+              <a:t>выберите </a:t>
+            </a:r>
+            <a:r>
+              <a:rPr lang="en-US" dirty="0" smtClean="0"/>
+              <a:t>ASP.NET Web Application</a:t>
+            </a:r>
+          </a:p>
+          <a:p>
+            <a:r>
+              <a:rPr lang="ru-RU" dirty="0" smtClean="0"/>
+              <a:t>Заполните поля:</a:t>
+            </a:r>
+          </a:p>
+          <a:p>
+            <a:pPr lvl="1"/>
+            <a:r>
+              <a:rPr lang="en-US" dirty="0" smtClean="0"/>
+              <a:t>Name – </a:t>
+            </a:r>
+            <a:r>
+              <a:rPr lang="ru-RU" dirty="0" smtClean="0"/>
+              <a:t>имя первого проекта в решении (приложении)</a:t>
+            </a:r>
+          </a:p>
+          <a:p>
+            <a:pPr lvl="1"/>
+            <a:r>
+              <a:rPr lang="en-US" dirty="0" smtClean="0"/>
+              <a:t>Location – </a:t>
+            </a:r>
+            <a:r>
+              <a:rPr lang="ru-RU" dirty="0" smtClean="0"/>
+              <a:t>расположение файлов решения </a:t>
+            </a:r>
+          </a:p>
+          <a:p>
+            <a:pPr lvl="1"/>
+            <a:r>
+              <a:rPr lang="en-US" dirty="0" smtClean="0"/>
+              <a:t>Solution – </a:t>
+            </a:r>
+            <a:r>
+              <a:rPr lang="ru-RU" dirty="0" smtClean="0"/>
+              <a:t>оставьте </a:t>
+            </a:r>
+            <a:r>
+              <a:rPr lang="en-US" dirty="0" smtClean="0"/>
+              <a:t>“Create new solution”</a:t>
+            </a:r>
+          </a:p>
+          <a:p>
+            <a:pPr lvl="1"/>
+            <a:r>
+              <a:rPr lang="en-US" dirty="0" smtClean="0"/>
+              <a:t>Solution name – </a:t>
+            </a:r>
+            <a:r>
+              <a:rPr lang="ru-RU" dirty="0" smtClean="0"/>
+              <a:t>имя решения (всего приложения)</a:t>
+            </a:r>
+          </a:p>
+          <a:p>
+            <a:pPr lvl="1"/>
+            <a:r>
+              <a:rPr lang="ru-RU" dirty="0" smtClean="0"/>
+              <a:t>Нажмите кнопку </a:t>
+            </a:r>
+            <a:r>
+              <a:rPr lang="en-US" dirty="0" smtClean="0"/>
+              <a:t>“OK”</a:t>
+            </a:r>
+          </a:p>
+          <a:p>
+            <a:r>
+              <a:rPr lang="ru-RU" dirty="0" smtClean="0"/>
+              <a:t>Выберите </a:t>
+            </a:r>
+            <a:r>
+              <a:rPr lang="en-US" dirty="0" smtClean="0"/>
+              <a:t>MVC, </a:t>
+            </a:r>
+            <a:r>
+              <a:rPr lang="ru-RU" dirty="0" smtClean="0"/>
+              <a:t>отметьте галочкой только</a:t>
+            </a:r>
+            <a:r>
+              <a:rPr lang="en-US" dirty="0" smtClean="0"/>
+              <a:t> MVC </a:t>
+            </a:r>
+            <a:r>
+              <a:rPr lang="ru-RU" dirty="0" smtClean="0"/>
+              <a:t>и </a:t>
+            </a:r>
+            <a:r>
+              <a:rPr lang="en-US" dirty="0" smtClean="0"/>
+              <a:t>Add new tests</a:t>
+            </a:r>
+          </a:p>
+          <a:p>
+            <a:r>
+              <a:rPr lang="ru-RU" dirty="0" smtClean="0"/>
+              <a:t>Нажмите </a:t>
+            </a:r>
+            <a:r>
+              <a:rPr lang="en-US" dirty="0" smtClean="0"/>
+              <a:t>“OK”</a:t>
+            </a:r>
+          </a:p>
+          <a:p>
+            <a:endParaRPr lang="en-US" dirty="0" smtClean="0"/>
+          </a:p>
           <a:p>
             <a:endParaRPr lang="en-GB" dirty="0"/>
           </a:p>
@@ -3879,14 +4025,16 @@
           </a:prstGeom>
         </p:spPr>
         <p:style>
-          <a:lnRef idx="0">
-            <a:schemeClr val="accent5"/>
+          <a:lnRef idx="2">
+            <a:schemeClr val="accent6">
+              <a:shade val="50000"/>
+            </a:schemeClr>
           </a:lnRef>
-          <a:fillRef idx="3">
-            <a:schemeClr val="accent5"/>
+          <a:fillRef idx="1">
+            <a:schemeClr val="accent6"/>
           </a:fillRef>
-          <a:effectRef idx="3">
-            <a:schemeClr val="accent5"/>
+          <a:effectRef idx="0">
+            <a:schemeClr val="accent6"/>
           </a:effectRef>
           <a:fontRef idx="minor">
             <a:schemeClr val="lt1"/>
@@ -3912,7 +4060,7 @@
     </p:spTree>
     <p:extLst>
       <p:ext uri="{BB962C8B-B14F-4D97-AF65-F5344CB8AC3E}">
-        <p14:creationId xmlns:p14="http://schemas.microsoft.com/office/powerpoint/2010/main" val="2637532497"/>
+        <p14:creationId xmlns:p14="http://schemas.microsoft.com/office/powerpoint/2010/main" val="453565188"/>
       </p:ext>
     </p:extLst>
   </p:cSld>
@@ -3961,7 +4109,7 @@
           <a:bodyPr/>
           <a:lstStyle/>
           <a:p>
-            <a:endParaRPr lang="en-GB"/>
+            <a:endParaRPr lang="en-GB" dirty="0"/>
           </a:p>
         </p:txBody>
       </p:sp>
@@ -4070,13 +4218,13 @@
         </p:spPr>
         <p:style>
           <a:lnRef idx="0">
-            <a:schemeClr val="accent6"/>
+            <a:schemeClr val="accent5"/>
           </a:lnRef>
           <a:fillRef idx="3">
-            <a:schemeClr val="accent6"/>
+            <a:schemeClr val="accent5"/>
           </a:fillRef>
           <a:effectRef idx="3">
-            <a:schemeClr val="accent6"/>
+            <a:schemeClr val="accent5"/>
           </a:effectRef>
           <a:fontRef idx="minor">
             <a:schemeClr val="lt1"/>
@@ -4102,7 +4250,1933 @@
     </p:spTree>
     <p:extLst>
       <p:ext uri="{BB962C8B-B14F-4D97-AF65-F5344CB8AC3E}">
-        <p14:creationId xmlns:p14="http://schemas.microsoft.com/office/powerpoint/2010/main" val="453565188"/>
+        <p14:creationId xmlns:p14="http://schemas.microsoft.com/office/powerpoint/2010/main" val="2637532497"/>
+      </p:ext>
+    </p:extLst>
+  </p:cSld>
+  <p:clrMapOvr>
+    <a:masterClrMapping/>
+  </p:clrMapOvr>
+  <p:timing>
+    <p:tnLst>
+      <p:par>
+        <p:cTn id="1" dur="indefinite" restart="never" nodeType="tmRoot"/>
+      </p:par>
+    </p:tnLst>
+  </p:timing>
+</p:sld>
+</file>
+
+<file path=ppt/slides/slide12.xml><?xml version="1.0" encoding="utf-8"?>
+<p:sld xmlns:a="http://schemas.openxmlformats.org/drawingml/2006/main" xmlns:r="http://schemas.openxmlformats.org/officeDocument/2006/relationships" xmlns:p="http://schemas.openxmlformats.org/presentationml/2006/main">
+  <p:cSld>
+    <p:spTree>
+      <p:nvGrpSpPr>
+        <p:cNvPr id="1" name=""/>
+        <p:cNvGrpSpPr/>
+        <p:nvPr/>
+      </p:nvGrpSpPr>
+      <p:grpSpPr>
+        <a:xfrm>
+          <a:off x="0" y="0"/>
+          <a:ext cx="0" cy="0"/>
+          <a:chOff x="0" y="0"/>
+          <a:chExt cx="0" cy="0"/>
+        </a:xfrm>
+      </p:grpSpPr>
+      <p:sp>
+        <p:nvSpPr>
+          <p:cNvPr id="2" name="Заголовок 1"/>
+          <p:cNvSpPr>
+            <a:spLocks noGrp="1"/>
+          </p:cNvSpPr>
+          <p:nvPr>
+            <p:ph type="title"/>
+          </p:nvPr>
+        </p:nvSpPr>
+        <p:spPr/>
+        <p:txBody>
+          <a:bodyPr/>
+          <a:lstStyle/>
+          <a:p>
+            <a:r>
+              <a:rPr lang="en-US" dirty="0" smtClean="0"/>
+              <a:t>Tab-tab action for code snippets</a:t>
+            </a:r>
+            <a:endParaRPr lang="en-GB" dirty="0"/>
+          </a:p>
+        </p:txBody>
+      </p:sp>
+      <p:sp>
+        <p:nvSpPr>
+          <p:cNvPr id="3" name="Объект 2"/>
+          <p:cNvSpPr>
+            <a:spLocks noGrp="1"/>
+          </p:cNvSpPr>
+          <p:nvPr>
+            <p:ph idx="1"/>
+          </p:nvPr>
+        </p:nvSpPr>
+        <p:spPr/>
+        <p:txBody>
+          <a:bodyPr/>
+          <a:lstStyle/>
+          <a:p>
+            <a:endParaRPr lang="en-GB"/>
+          </a:p>
+        </p:txBody>
+      </p:sp>
+      <p:sp>
+        <p:nvSpPr>
+          <p:cNvPr id="4" name="Дата 3"/>
+          <p:cNvSpPr>
+            <a:spLocks noGrp="1"/>
+          </p:cNvSpPr>
+          <p:nvPr>
+            <p:ph type="dt" sz="half" idx="10"/>
+          </p:nvPr>
+        </p:nvSpPr>
+        <p:spPr/>
+        <p:txBody>
+          <a:bodyPr/>
+          <a:lstStyle/>
+          <a:p>
+            <a:r>
+              <a:rPr lang="en-US" smtClean="0"/>
+              <a:t>01.03.2016</a:t>
+            </a:r>
+            <a:endParaRPr lang="en-GB"/>
+          </a:p>
+        </p:txBody>
+      </p:sp>
+      <p:sp>
+        <p:nvSpPr>
+          <p:cNvPr id="5" name="Нижний колонтитул 4"/>
+          <p:cNvSpPr>
+            <a:spLocks noGrp="1"/>
+          </p:cNvSpPr>
+          <p:nvPr>
+            <p:ph type="ftr" sz="quarter" idx="11"/>
+          </p:nvPr>
+        </p:nvSpPr>
+        <p:spPr/>
+        <p:txBody>
+          <a:bodyPr/>
+          <a:lstStyle/>
+          <a:p>
+            <a:r>
+              <a:rPr lang="ru-RU" smtClean="0"/>
+              <a:t>Ваганов Михаил Викторович  ASP.NET MVC + Oracle Database</a:t>
+            </a:r>
+            <a:endParaRPr lang="en-GB"/>
+          </a:p>
+        </p:txBody>
+      </p:sp>
+      <p:sp>
+        <p:nvSpPr>
+          <p:cNvPr id="6" name="Номер слайда 5"/>
+          <p:cNvSpPr>
+            <a:spLocks noGrp="1"/>
+          </p:cNvSpPr>
+          <p:nvPr>
+            <p:ph type="sldNum" sz="quarter" idx="12"/>
+          </p:nvPr>
+        </p:nvSpPr>
+        <p:spPr/>
+        <p:txBody>
+          <a:bodyPr/>
+          <a:lstStyle/>
+          <a:p>
+            <a:fld id="{8FD3F87F-7A79-4F3D-8F12-CD11A20D067D}" type="slidenum">
+              <a:rPr lang="en-GB" smtClean="0"/>
+              <a:t>12</a:t>
+            </a:fld>
+            <a:endParaRPr lang="en-GB"/>
+          </a:p>
+        </p:txBody>
+      </p:sp>
+    </p:spTree>
+    <p:extLst>
+      <p:ext uri="{BB962C8B-B14F-4D97-AF65-F5344CB8AC3E}">
+        <p14:creationId xmlns:p14="http://schemas.microsoft.com/office/powerpoint/2010/main" val="2112355702"/>
+      </p:ext>
+    </p:extLst>
+  </p:cSld>
+  <p:clrMapOvr>
+    <a:masterClrMapping/>
+  </p:clrMapOvr>
+  <p:timing>
+    <p:tnLst>
+      <p:par>
+        <p:cTn id="1" dur="indefinite" restart="never" nodeType="tmRoot"/>
+      </p:par>
+    </p:tnLst>
+  </p:timing>
+</p:sld>
+</file>
+
+<file path=ppt/slides/slide13.xml><?xml version="1.0" encoding="utf-8"?>
+<p:sld xmlns:a="http://schemas.openxmlformats.org/drawingml/2006/main" xmlns:r="http://schemas.openxmlformats.org/officeDocument/2006/relationships" xmlns:p="http://schemas.openxmlformats.org/presentationml/2006/main">
+  <p:cSld>
+    <p:spTree>
+      <p:nvGrpSpPr>
+        <p:cNvPr id="1" name=""/>
+        <p:cNvGrpSpPr/>
+        <p:nvPr/>
+      </p:nvGrpSpPr>
+      <p:grpSpPr>
+        <a:xfrm>
+          <a:off x="0" y="0"/>
+          <a:ext cx="0" cy="0"/>
+          <a:chOff x="0" y="0"/>
+          <a:chExt cx="0" cy="0"/>
+        </a:xfrm>
+      </p:grpSpPr>
+      <p:sp>
+        <p:nvSpPr>
+          <p:cNvPr id="2" name="Заголовок 1"/>
+          <p:cNvSpPr>
+            <a:spLocks noGrp="1"/>
+          </p:cNvSpPr>
+          <p:nvPr>
+            <p:ph type="title"/>
+          </p:nvPr>
+        </p:nvSpPr>
+        <p:spPr/>
+        <p:txBody>
+          <a:bodyPr/>
+          <a:lstStyle/>
+          <a:p>
+            <a:r>
+              <a:rPr lang="en-US" dirty="0" smtClean="0"/>
+              <a:t>Generate inexistent class</a:t>
+            </a:r>
+            <a:endParaRPr lang="en-GB" dirty="0"/>
+          </a:p>
+        </p:txBody>
+      </p:sp>
+      <p:sp>
+        <p:nvSpPr>
+          <p:cNvPr id="3" name="Объект 2"/>
+          <p:cNvSpPr>
+            <a:spLocks noGrp="1"/>
+          </p:cNvSpPr>
+          <p:nvPr>
+            <p:ph idx="1"/>
+          </p:nvPr>
+        </p:nvSpPr>
+        <p:spPr/>
+        <p:txBody>
+          <a:bodyPr/>
+          <a:lstStyle/>
+          <a:p>
+            <a:endParaRPr lang="en-GB"/>
+          </a:p>
+        </p:txBody>
+      </p:sp>
+      <p:sp>
+        <p:nvSpPr>
+          <p:cNvPr id="4" name="Дата 3"/>
+          <p:cNvSpPr>
+            <a:spLocks noGrp="1"/>
+          </p:cNvSpPr>
+          <p:nvPr>
+            <p:ph type="dt" sz="half" idx="10"/>
+          </p:nvPr>
+        </p:nvSpPr>
+        <p:spPr/>
+        <p:txBody>
+          <a:bodyPr/>
+          <a:lstStyle/>
+          <a:p>
+            <a:r>
+              <a:rPr lang="en-US" smtClean="0"/>
+              <a:t>01.03.2016</a:t>
+            </a:r>
+            <a:endParaRPr lang="en-GB"/>
+          </a:p>
+        </p:txBody>
+      </p:sp>
+      <p:sp>
+        <p:nvSpPr>
+          <p:cNvPr id="5" name="Нижний колонтитул 4"/>
+          <p:cNvSpPr>
+            <a:spLocks noGrp="1"/>
+          </p:cNvSpPr>
+          <p:nvPr>
+            <p:ph type="ftr" sz="quarter" idx="11"/>
+          </p:nvPr>
+        </p:nvSpPr>
+        <p:spPr/>
+        <p:txBody>
+          <a:bodyPr/>
+          <a:lstStyle/>
+          <a:p>
+            <a:r>
+              <a:rPr lang="ru-RU" smtClean="0"/>
+              <a:t>Ваганов Михаил Викторович  ASP.NET MVC + Oracle Database</a:t>
+            </a:r>
+            <a:endParaRPr lang="en-GB"/>
+          </a:p>
+        </p:txBody>
+      </p:sp>
+      <p:sp>
+        <p:nvSpPr>
+          <p:cNvPr id="6" name="Номер слайда 5"/>
+          <p:cNvSpPr>
+            <a:spLocks noGrp="1"/>
+          </p:cNvSpPr>
+          <p:nvPr>
+            <p:ph type="sldNum" sz="quarter" idx="12"/>
+          </p:nvPr>
+        </p:nvSpPr>
+        <p:spPr/>
+        <p:txBody>
+          <a:bodyPr/>
+          <a:lstStyle/>
+          <a:p>
+            <a:fld id="{8FD3F87F-7A79-4F3D-8F12-CD11A20D067D}" type="slidenum">
+              <a:rPr lang="en-GB" smtClean="0"/>
+              <a:t>13</a:t>
+            </a:fld>
+            <a:endParaRPr lang="en-GB"/>
+          </a:p>
+        </p:txBody>
+      </p:sp>
+    </p:spTree>
+    <p:extLst>
+      <p:ext uri="{BB962C8B-B14F-4D97-AF65-F5344CB8AC3E}">
+        <p14:creationId xmlns:p14="http://schemas.microsoft.com/office/powerpoint/2010/main" val="4027976701"/>
+      </p:ext>
+    </p:extLst>
+  </p:cSld>
+  <p:clrMapOvr>
+    <a:masterClrMapping/>
+  </p:clrMapOvr>
+  <p:timing>
+    <p:tnLst>
+      <p:par>
+        <p:cTn id="1" dur="indefinite" restart="never" nodeType="tmRoot"/>
+      </p:par>
+    </p:tnLst>
+  </p:timing>
+</p:sld>
+</file>
+
+<file path=ppt/slides/slide14.xml><?xml version="1.0" encoding="utf-8"?>
+<p:sld xmlns:a="http://schemas.openxmlformats.org/drawingml/2006/main" xmlns:r="http://schemas.openxmlformats.org/officeDocument/2006/relationships" xmlns:p="http://schemas.openxmlformats.org/presentationml/2006/main">
+  <p:cSld>
+    <p:spTree>
+      <p:nvGrpSpPr>
+        <p:cNvPr id="1" name=""/>
+        <p:cNvGrpSpPr/>
+        <p:nvPr/>
+      </p:nvGrpSpPr>
+      <p:grpSpPr>
+        <a:xfrm>
+          <a:off x="0" y="0"/>
+          <a:ext cx="0" cy="0"/>
+          <a:chOff x="0" y="0"/>
+          <a:chExt cx="0" cy="0"/>
+        </a:xfrm>
+      </p:grpSpPr>
+      <p:sp>
+        <p:nvSpPr>
+          <p:cNvPr id="2" name="Заголовок 1"/>
+          <p:cNvSpPr>
+            <a:spLocks noGrp="1"/>
+          </p:cNvSpPr>
+          <p:nvPr>
+            <p:ph type="title"/>
+          </p:nvPr>
+        </p:nvSpPr>
+        <p:spPr/>
+        <p:txBody>
+          <a:bodyPr/>
+          <a:lstStyle/>
+          <a:p>
+            <a:r>
+              <a:rPr lang="en-US" dirty="0" smtClean="0"/>
+              <a:t>Build and add control MVC 5 controller with </a:t>
+            </a:r>
+            <a:r>
+              <a:rPr lang="en-US" dirty="0" err="1" smtClean="0"/>
+              <a:t>smth</a:t>
+            </a:r>
+            <a:r>
+              <a:rPr lang="en-US" dirty="0" smtClean="0"/>
+              <a:t>. </a:t>
+            </a:r>
+            <a:endParaRPr lang="en-GB" dirty="0"/>
+          </a:p>
+        </p:txBody>
+      </p:sp>
+      <p:sp>
+        <p:nvSpPr>
+          <p:cNvPr id="3" name="Объект 2"/>
+          <p:cNvSpPr>
+            <a:spLocks noGrp="1"/>
+          </p:cNvSpPr>
+          <p:nvPr>
+            <p:ph idx="1"/>
+          </p:nvPr>
+        </p:nvSpPr>
+        <p:spPr/>
+        <p:txBody>
+          <a:bodyPr/>
+          <a:lstStyle/>
+          <a:p>
+            <a:r>
+              <a:rPr lang="en-US" dirty="0" smtClean="0"/>
+              <a:t>To do: do not forget about one-to-one and one-to-many relations</a:t>
+            </a:r>
+            <a:endParaRPr lang="en-GB" dirty="0"/>
+          </a:p>
+        </p:txBody>
+      </p:sp>
+      <p:sp>
+        <p:nvSpPr>
+          <p:cNvPr id="4" name="Дата 3"/>
+          <p:cNvSpPr>
+            <a:spLocks noGrp="1"/>
+          </p:cNvSpPr>
+          <p:nvPr>
+            <p:ph type="dt" sz="half" idx="10"/>
+          </p:nvPr>
+        </p:nvSpPr>
+        <p:spPr/>
+        <p:txBody>
+          <a:bodyPr/>
+          <a:lstStyle/>
+          <a:p>
+            <a:r>
+              <a:rPr lang="en-US" smtClean="0"/>
+              <a:t>01.03.2016</a:t>
+            </a:r>
+            <a:endParaRPr lang="en-GB"/>
+          </a:p>
+        </p:txBody>
+      </p:sp>
+      <p:sp>
+        <p:nvSpPr>
+          <p:cNvPr id="5" name="Нижний колонтитул 4"/>
+          <p:cNvSpPr>
+            <a:spLocks noGrp="1"/>
+          </p:cNvSpPr>
+          <p:nvPr>
+            <p:ph type="ftr" sz="quarter" idx="11"/>
+          </p:nvPr>
+        </p:nvSpPr>
+        <p:spPr/>
+        <p:txBody>
+          <a:bodyPr/>
+          <a:lstStyle/>
+          <a:p>
+            <a:r>
+              <a:rPr lang="ru-RU" smtClean="0"/>
+              <a:t>Ваганов Михаил Викторович  ASP.NET MVC + Oracle Database</a:t>
+            </a:r>
+            <a:endParaRPr lang="en-GB"/>
+          </a:p>
+        </p:txBody>
+      </p:sp>
+      <p:sp>
+        <p:nvSpPr>
+          <p:cNvPr id="6" name="Номер слайда 5"/>
+          <p:cNvSpPr>
+            <a:spLocks noGrp="1"/>
+          </p:cNvSpPr>
+          <p:nvPr>
+            <p:ph type="sldNum" sz="quarter" idx="12"/>
+          </p:nvPr>
+        </p:nvSpPr>
+        <p:spPr/>
+        <p:txBody>
+          <a:bodyPr/>
+          <a:lstStyle/>
+          <a:p>
+            <a:fld id="{8FD3F87F-7A79-4F3D-8F12-CD11A20D067D}" type="slidenum">
+              <a:rPr lang="en-GB" smtClean="0"/>
+              <a:t>14</a:t>
+            </a:fld>
+            <a:endParaRPr lang="en-GB"/>
+          </a:p>
+        </p:txBody>
+      </p:sp>
+    </p:spTree>
+    <p:extLst>
+      <p:ext uri="{BB962C8B-B14F-4D97-AF65-F5344CB8AC3E}">
+        <p14:creationId xmlns:p14="http://schemas.microsoft.com/office/powerpoint/2010/main" val="1655495050"/>
+      </p:ext>
+    </p:extLst>
+  </p:cSld>
+  <p:clrMapOvr>
+    <a:masterClrMapping/>
+  </p:clrMapOvr>
+  <p:timing>
+    <p:tnLst>
+      <p:par>
+        <p:cTn id="1" dur="indefinite" restart="never" nodeType="tmRoot"/>
+      </p:par>
+    </p:tnLst>
+  </p:timing>
+</p:sld>
+</file>
+
+<file path=ppt/slides/slide15.xml><?xml version="1.0" encoding="utf-8"?>
+<p:sld xmlns:a="http://schemas.openxmlformats.org/drawingml/2006/main" xmlns:r="http://schemas.openxmlformats.org/officeDocument/2006/relationships" xmlns:p="http://schemas.openxmlformats.org/presentationml/2006/main">
+  <p:cSld>
+    <p:spTree>
+      <p:nvGrpSpPr>
+        <p:cNvPr id="1" name=""/>
+        <p:cNvGrpSpPr/>
+        <p:nvPr/>
+      </p:nvGrpSpPr>
+      <p:grpSpPr>
+        <a:xfrm>
+          <a:off x="0" y="0"/>
+          <a:ext cx="0" cy="0"/>
+          <a:chOff x="0" y="0"/>
+          <a:chExt cx="0" cy="0"/>
+        </a:xfrm>
+      </p:grpSpPr>
+      <p:sp>
+        <p:nvSpPr>
+          <p:cNvPr id="2" name="Заголовок 1"/>
+          <p:cNvSpPr>
+            <a:spLocks noGrp="1"/>
+          </p:cNvSpPr>
+          <p:nvPr>
+            <p:ph type="title"/>
+          </p:nvPr>
+        </p:nvSpPr>
+        <p:spPr/>
+        <p:txBody>
+          <a:bodyPr/>
+          <a:lstStyle/>
+          <a:p>
+            <a:r>
+              <a:rPr lang="ru-RU" dirty="0" smtClean="0"/>
+              <a:t>Схема приложения</a:t>
+            </a:r>
+            <a:endParaRPr lang="en-GB" dirty="0"/>
+          </a:p>
+        </p:txBody>
+      </p:sp>
+      <p:sp>
+        <p:nvSpPr>
+          <p:cNvPr id="3" name="Объект 2"/>
+          <p:cNvSpPr>
+            <a:spLocks noGrp="1"/>
+          </p:cNvSpPr>
+          <p:nvPr>
+            <p:ph idx="1"/>
+          </p:nvPr>
+        </p:nvSpPr>
+        <p:spPr/>
+        <p:txBody>
+          <a:bodyPr/>
+          <a:lstStyle/>
+          <a:p>
+            <a:endParaRPr lang="en-GB"/>
+          </a:p>
+        </p:txBody>
+      </p:sp>
+      <p:sp>
+        <p:nvSpPr>
+          <p:cNvPr id="4" name="Дата 3"/>
+          <p:cNvSpPr>
+            <a:spLocks noGrp="1"/>
+          </p:cNvSpPr>
+          <p:nvPr>
+            <p:ph type="dt" sz="half" idx="10"/>
+          </p:nvPr>
+        </p:nvSpPr>
+        <p:spPr/>
+        <p:txBody>
+          <a:bodyPr/>
+          <a:lstStyle/>
+          <a:p>
+            <a:r>
+              <a:rPr lang="en-US" smtClean="0"/>
+              <a:t>01.03.2016</a:t>
+            </a:r>
+            <a:endParaRPr lang="en-GB"/>
+          </a:p>
+        </p:txBody>
+      </p:sp>
+      <p:sp>
+        <p:nvSpPr>
+          <p:cNvPr id="5" name="Нижний колонтитул 4"/>
+          <p:cNvSpPr>
+            <a:spLocks noGrp="1"/>
+          </p:cNvSpPr>
+          <p:nvPr>
+            <p:ph type="ftr" sz="quarter" idx="11"/>
+          </p:nvPr>
+        </p:nvSpPr>
+        <p:spPr/>
+        <p:txBody>
+          <a:bodyPr/>
+          <a:lstStyle/>
+          <a:p>
+            <a:r>
+              <a:rPr lang="ru-RU" smtClean="0"/>
+              <a:t>Ваганов Михаил Викторович  ASP.NET MVC + Oracle Database</a:t>
+            </a:r>
+            <a:endParaRPr lang="en-GB"/>
+          </a:p>
+        </p:txBody>
+      </p:sp>
+      <p:sp>
+        <p:nvSpPr>
+          <p:cNvPr id="6" name="Номер слайда 5"/>
+          <p:cNvSpPr>
+            <a:spLocks noGrp="1"/>
+          </p:cNvSpPr>
+          <p:nvPr>
+            <p:ph type="sldNum" sz="quarter" idx="12"/>
+          </p:nvPr>
+        </p:nvSpPr>
+        <p:spPr/>
+        <p:txBody>
+          <a:bodyPr/>
+          <a:lstStyle/>
+          <a:p>
+            <a:fld id="{8FD3F87F-7A79-4F3D-8F12-CD11A20D067D}" type="slidenum">
+              <a:rPr lang="en-GB" smtClean="0"/>
+              <a:t>15</a:t>
+            </a:fld>
+            <a:endParaRPr lang="en-GB"/>
+          </a:p>
+        </p:txBody>
+      </p:sp>
+    </p:spTree>
+    <p:extLst>
+      <p:ext uri="{BB962C8B-B14F-4D97-AF65-F5344CB8AC3E}">
+        <p14:creationId xmlns:p14="http://schemas.microsoft.com/office/powerpoint/2010/main" val="759459816"/>
+      </p:ext>
+    </p:extLst>
+  </p:cSld>
+  <p:clrMapOvr>
+    <a:masterClrMapping/>
+  </p:clrMapOvr>
+  <p:timing>
+    <p:tnLst>
+      <p:par>
+        <p:cTn id="1" dur="indefinite" restart="never" nodeType="tmRoot"/>
+      </p:par>
+    </p:tnLst>
+  </p:timing>
+</p:sld>
+</file>
+
+<file path=ppt/slides/slide16.xml><?xml version="1.0" encoding="utf-8"?>
+<p:sld xmlns:a="http://schemas.openxmlformats.org/drawingml/2006/main" xmlns:r="http://schemas.openxmlformats.org/officeDocument/2006/relationships" xmlns:p="http://schemas.openxmlformats.org/presentationml/2006/main">
+  <p:cSld>
+    <p:spTree>
+      <p:nvGrpSpPr>
+        <p:cNvPr id="1" name=""/>
+        <p:cNvGrpSpPr/>
+        <p:nvPr/>
+      </p:nvGrpSpPr>
+      <p:grpSpPr>
+        <a:xfrm>
+          <a:off x="0" y="0"/>
+          <a:ext cx="0" cy="0"/>
+          <a:chOff x="0" y="0"/>
+          <a:chExt cx="0" cy="0"/>
+        </a:xfrm>
+      </p:grpSpPr>
+      <p:sp>
+        <p:nvSpPr>
+          <p:cNvPr id="2" name="Заголовок 1"/>
+          <p:cNvSpPr>
+            <a:spLocks noGrp="1"/>
+          </p:cNvSpPr>
+          <p:nvPr>
+            <p:ph type="title"/>
+          </p:nvPr>
+        </p:nvSpPr>
+        <p:spPr/>
+        <p:txBody>
+          <a:bodyPr/>
+          <a:lstStyle/>
+          <a:p>
+            <a:r>
+              <a:rPr lang="en-US" dirty="0" smtClean="0"/>
+              <a:t>Models</a:t>
+            </a:r>
+            <a:endParaRPr lang="en-GB" dirty="0"/>
+          </a:p>
+        </p:txBody>
+      </p:sp>
+      <p:sp>
+        <p:nvSpPr>
+          <p:cNvPr id="3" name="Объект 2"/>
+          <p:cNvSpPr>
+            <a:spLocks noGrp="1"/>
+          </p:cNvSpPr>
+          <p:nvPr>
+            <p:ph idx="1"/>
+          </p:nvPr>
+        </p:nvSpPr>
+        <p:spPr/>
+        <p:txBody>
+          <a:bodyPr/>
+          <a:lstStyle/>
+          <a:p>
+            <a:r>
+              <a:rPr lang="en-US" dirty="0" smtClean="0"/>
+              <a:t>To do: user, role</a:t>
+            </a:r>
+          </a:p>
+          <a:p>
+            <a:r>
+              <a:rPr lang="ru-RU" dirty="0" smtClean="0"/>
+              <a:t>Пользователь определяет, с какими моделями он хочет работать</a:t>
+            </a:r>
+          </a:p>
+          <a:p>
+            <a:r>
+              <a:rPr lang="ru-RU" dirty="0" smtClean="0"/>
+              <a:t>Мы хотим, чтобы модель везде отображалась одинаково, поэтому сюда и помещаем атрибуты отображения</a:t>
+            </a:r>
+            <a:endParaRPr lang="ru-RU" dirty="0"/>
+          </a:p>
+          <a:p>
+            <a:r>
+              <a:rPr lang="ru-RU" dirty="0" smtClean="0"/>
+              <a:t>Атрибуты</a:t>
+            </a:r>
+          </a:p>
+          <a:p>
+            <a:pPr lvl="1"/>
+            <a:r>
+              <a:rPr lang="ru-RU" dirty="0" smtClean="0"/>
+              <a:t>Тип данных</a:t>
+            </a:r>
+          </a:p>
+          <a:p>
+            <a:pPr lvl="1"/>
+            <a:r>
+              <a:rPr lang="ru-RU" dirty="0" smtClean="0"/>
+              <a:t>Отображения</a:t>
+            </a:r>
+          </a:p>
+          <a:p>
+            <a:pPr lvl="1"/>
+            <a:r>
+              <a:rPr lang="ru-RU" dirty="0" err="1" smtClean="0"/>
+              <a:t>Валидации</a:t>
+            </a:r>
+            <a:endParaRPr lang="ru-RU" dirty="0" smtClean="0"/>
+          </a:p>
+          <a:p>
+            <a:r>
+              <a:rPr lang="en-US" dirty="0" smtClean="0"/>
+              <a:t>Model binding</a:t>
+            </a:r>
+            <a:endParaRPr lang="ru-RU" dirty="0" smtClean="0"/>
+          </a:p>
+        </p:txBody>
+      </p:sp>
+      <p:sp>
+        <p:nvSpPr>
+          <p:cNvPr id="4" name="Дата 3"/>
+          <p:cNvSpPr>
+            <a:spLocks noGrp="1"/>
+          </p:cNvSpPr>
+          <p:nvPr>
+            <p:ph type="dt" sz="half" idx="10"/>
+          </p:nvPr>
+        </p:nvSpPr>
+        <p:spPr/>
+        <p:txBody>
+          <a:bodyPr/>
+          <a:lstStyle/>
+          <a:p>
+            <a:r>
+              <a:rPr lang="en-US" smtClean="0"/>
+              <a:t>01.03.2016</a:t>
+            </a:r>
+            <a:endParaRPr lang="en-GB"/>
+          </a:p>
+        </p:txBody>
+      </p:sp>
+      <p:sp>
+        <p:nvSpPr>
+          <p:cNvPr id="5" name="Нижний колонтитул 4"/>
+          <p:cNvSpPr>
+            <a:spLocks noGrp="1"/>
+          </p:cNvSpPr>
+          <p:nvPr>
+            <p:ph type="ftr" sz="quarter" idx="11"/>
+          </p:nvPr>
+        </p:nvSpPr>
+        <p:spPr/>
+        <p:txBody>
+          <a:bodyPr/>
+          <a:lstStyle/>
+          <a:p>
+            <a:r>
+              <a:rPr lang="ru-RU" smtClean="0"/>
+              <a:t>Ваганов Михаил Викторович  ASP.NET MVC + Oracle Database</a:t>
+            </a:r>
+            <a:endParaRPr lang="en-GB"/>
+          </a:p>
+        </p:txBody>
+      </p:sp>
+      <p:sp>
+        <p:nvSpPr>
+          <p:cNvPr id="6" name="Номер слайда 5"/>
+          <p:cNvSpPr>
+            <a:spLocks noGrp="1"/>
+          </p:cNvSpPr>
+          <p:nvPr>
+            <p:ph type="sldNum" sz="quarter" idx="12"/>
+          </p:nvPr>
+        </p:nvSpPr>
+        <p:spPr/>
+        <p:txBody>
+          <a:bodyPr/>
+          <a:lstStyle/>
+          <a:p>
+            <a:fld id="{8FD3F87F-7A79-4F3D-8F12-CD11A20D067D}" type="slidenum">
+              <a:rPr lang="en-GB" smtClean="0"/>
+              <a:t>16</a:t>
+            </a:fld>
+            <a:endParaRPr lang="en-GB"/>
+          </a:p>
+        </p:txBody>
+      </p:sp>
+    </p:spTree>
+    <p:extLst>
+      <p:ext uri="{BB962C8B-B14F-4D97-AF65-F5344CB8AC3E}">
+        <p14:creationId xmlns:p14="http://schemas.microsoft.com/office/powerpoint/2010/main" val="3343533271"/>
+      </p:ext>
+    </p:extLst>
+  </p:cSld>
+  <p:clrMapOvr>
+    <a:masterClrMapping/>
+  </p:clrMapOvr>
+  <p:timing>
+    <p:tnLst>
+      <p:par>
+        <p:cTn id="1" dur="indefinite" restart="never" nodeType="tmRoot"/>
+      </p:par>
+    </p:tnLst>
+  </p:timing>
+</p:sld>
+</file>
+
+<file path=ppt/slides/slide17.xml><?xml version="1.0" encoding="utf-8"?>
+<p:sld xmlns:a="http://schemas.openxmlformats.org/drawingml/2006/main" xmlns:r="http://schemas.openxmlformats.org/officeDocument/2006/relationships" xmlns:p="http://schemas.openxmlformats.org/presentationml/2006/main">
+  <p:cSld>
+    <p:spTree>
+      <p:nvGrpSpPr>
+        <p:cNvPr id="1" name=""/>
+        <p:cNvGrpSpPr/>
+        <p:nvPr/>
+      </p:nvGrpSpPr>
+      <p:grpSpPr>
+        <a:xfrm>
+          <a:off x="0" y="0"/>
+          <a:ext cx="0" cy="0"/>
+          <a:chOff x="0" y="0"/>
+          <a:chExt cx="0" cy="0"/>
+        </a:xfrm>
+      </p:grpSpPr>
+      <p:sp>
+        <p:nvSpPr>
+          <p:cNvPr id="2" name="Заголовок 1"/>
+          <p:cNvSpPr>
+            <a:spLocks noGrp="1"/>
+          </p:cNvSpPr>
+          <p:nvPr>
+            <p:ph type="title"/>
+          </p:nvPr>
+        </p:nvSpPr>
+        <p:spPr/>
+        <p:txBody>
+          <a:bodyPr/>
+          <a:lstStyle/>
+          <a:p>
+            <a:r>
+              <a:rPr lang="ru-RU" dirty="0" smtClean="0"/>
+              <a:t>Атрибут типа данных</a:t>
+            </a:r>
+            <a:endParaRPr lang="en-GB" dirty="0"/>
+          </a:p>
+        </p:txBody>
+      </p:sp>
+      <p:sp>
+        <p:nvSpPr>
+          <p:cNvPr id="3" name="Объект 2"/>
+          <p:cNvSpPr>
+            <a:spLocks noGrp="1"/>
+          </p:cNvSpPr>
+          <p:nvPr>
+            <p:ph idx="1"/>
+          </p:nvPr>
+        </p:nvSpPr>
+        <p:spPr/>
+        <p:txBody>
+          <a:bodyPr/>
+          <a:lstStyle/>
+          <a:p>
+            <a:r>
+              <a:rPr lang="ru-RU" dirty="0" err="1" smtClean="0"/>
+              <a:t>Валидация</a:t>
+            </a:r>
+            <a:endParaRPr lang="ru-RU" dirty="0" smtClean="0"/>
+          </a:p>
+          <a:p>
+            <a:r>
+              <a:rPr lang="en-US" dirty="0" smtClean="0"/>
+              <a:t>Input controls</a:t>
+            </a:r>
+          </a:p>
+          <a:p>
+            <a:pPr lvl="1"/>
+            <a:r>
+              <a:rPr lang="en-US" dirty="0" smtClean="0"/>
+              <a:t>HTML5 (MVC </a:t>
+            </a:r>
+            <a:r>
+              <a:rPr lang="ru-RU" dirty="0" err="1" smtClean="0"/>
+              <a:t>подстравивает</a:t>
+            </a:r>
+            <a:r>
+              <a:rPr lang="ru-RU" dirty="0" smtClean="0"/>
+              <a:t> под поле </a:t>
+            </a:r>
+            <a:r>
+              <a:rPr lang="en-US" dirty="0" smtClean="0"/>
+              <a:t>GUI)</a:t>
+            </a:r>
+          </a:p>
+          <a:p>
+            <a:pPr lvl="1"/>
+            <a:endParaRPr lang="en-GB" dirty="0"/>
+          </a:p>
+        </p:txBody>
+      </p:sp>
+      <p:sp>
+        <p:nvSpPr>
+          <p:cNvPr id="4" name="Дата 3"/>
+          <p:cNvSpPr>
+            <a:spLocks noGrp="1"/>
+          </p:cNvSpPr>
+          <p:nvPr>
+            <p:ph type="dt" sz="half" idx="10"/>
+          </p:nvPr>
+        </p:nvSpPr>
+        <p:spPr/>
+        <p:txBody>
+          <a:bodyPr/>
+          <a:lstStyle/>
+          <a:p>
+            <a:r>
+              <a:rPr lang="en-US" smtClean="0"/>
+              <a:t>01.03.2016</a:t>
+            </a:r>
+            <a:endParaRPr lang="en-GB"/>
+          </a:p>
+        </p:txBody>
+      </p:sp>
+      <p:sp>
+        <p:nvSpPr>
+          <p:cNvPr id="5" name="Нижний колонтитул 4"/>
+          <p:cNvSpPr>
+            <a:spLocks noGrp="1"/>
+          </p:cNvSpPr>
+          <p:nvPr>
+            <p:ph type="ftr" sz="quarter" idx="11"/>
+          </p:nvPr>
+        </p:nvSpPr>
+        <p:spPr/>
+        <p:txBody>
+          <a:bodyPr/>
+          <a:lstStyle/>
+          <a:p>
+            <a:r>
+              <a:rPr lang="ru-RU" smtClean="0"/>
+              <a:t>Ваганов Михаил Викторович  ASP.NET MVC + Oracle Database</a:t>
+            </a:r>
+            <a:endParaRPr lang="en-GB"/>
+          </a:p>
+        </p:txBody>
+      </p:sp>
+      <p:sp>
+        <p:nvSpPr>
+          <p:cNvPr id="6" name="Номер слайда 5"/>
+          <p:cNvSpPr>
+            <a:spLocks noGrp="1"/>
+          </p:cNvSpPr>
+          <p:nvPr>
+            <p:ph type="sldNum" sz="quarter" idx="12"/>
+          </p:nvPr>
+        </p:nvSpPr>
+        <p:spPr/>
+        <p:txBody>
+          <a:bodyPr/>
+          <a:lstStyle/>
+          <a:p>
+            <a:fld id="{8FD3F87F-7A79-4F3D-8F12-CD11A20D067D}" type="slidenum">
+              <a:rPr lang="en-GB" smtClean="0"/>
+              <a:t>17</a:t>
+            </a:fld>
+            <a:endParaRPr lang="en-GB"/>
+          </a:p>
+        </p:txBody>
+      </p:sp>
+    </p:spTree>
+    <p:extLst>
+      <p:ext uri="{BB962C8B-B14F-4D97-AF65-F5344CB8AC3E}">
+        <p14:creationId xmlns:p14="http://schemas.microsoft.com/office/powerpoint/2010/main" val="3367010310"/>
+      </p:ext>
+    </p:extLst>
+  </p:cSld>
+  <p:clrMapOvr>
+    <a:masterClrMapping/>
+  </p:clrMapOvr>
+  <p:timing>
+    <p:tnLst>
+      <p:par>
+        <p:cTn id="1" dur="indefinite" restart="never" nodeType="tmRoot"/>
+      </p:par>
+    </p:tnLst>
+  </p:timing>
+</p:sld>
+</file>
+
+<file path=ppt/slides/slide18.xml><?xml version="1.0" encoding="utf-8"?>
+<p:sld xmlns:a="http://schemas.openxmlformats.org/drawingml/2006/main" xmlns:r="http://schemas.openxmlformats.org/officeDocument/2006/relationships" xmlns:p="http://schemas.openxmlformats.org/presentationml/2006/main">
+  <p:cSld>
+    <p:spTree>
+      <p:nvGrpSpPr>
+        <p:cNvPr id="1" name=""/>
+        <p:cNvGrpSpPr/>
+        <p:nvPr/>
+      </p:nvGrpSpPr>
+      <p:grpSpPr>
+        <a:xfrm>
+          <a:off x="0" y="0"/>
+          <a:ext cx="0" cy="0"/>
+          <a:chOff x="0" y="0"/>
+          <a:chExt cx="0" cy="0"/>
+        </a:xfrm>
+      </p:grpSpPr>
+      <p:sp>
+        <p:nvSpPr>
+          <p:cNvPr id="2" name="Заголовок 1"/>
+          <p:cNvSpPr>
+            <a:spLocks noGrp="1"/>
+          </p:cNvSpPr>
+          <p:nvPr>
+            <p:ph type="title"/>
+          </p:nvPr>
+        </p:nvSpPr>
+        <p:spPr/>
+        <p:txBody>
+          <a:bodyPr/>
+          <a:lstStyle/>
+          <a:p>
+            <a:r>
+              <a:rPr lang="ru-RU" dirty="0" smtClean="0"/>
+              <a:t>Отношение </a:t>
+            </a:r>
+            <a:r>
+              <a:rPr lang="en-US" dirty="0" smtClean="0"/>
+              <a:t>One-to-one</a:t>
+            </a:r>
+            <a:endParaRPr lang="en-GB" dirty="0"/>
+          </a:p>
+        </p:txBody>
+      </p:sp>
+      <p:sp>
+        <p:nvSpPr>
+          <p:cNvPr id="4" name="Дата 3"/>
+          <p:cNvSpPr>
+            <a:spLocks noGrp="1"/>
+          </p:cNvSpPr>
+          <p:nvPr>
+            <p:ph type="dt" sz="half" idx="10"/>
+          </p:nvPr>
+        </p:nvSpPr>
+        <p:spPr/>
+        <p:txBody>
+          <a:bodyPr/>
+          <a:lstStyle/>
+          <a:p>
+            <a:r>
+              <a:rPr lang="en-US" smtClean="0"/>
+              <a:t>01.03.2016</a:t>
+            </a:r>
+            <a:endParaRPr lang="en-GB"/>
+          </a:p>
+        </p:txBody>
+      </p:sp>
+      <p:sp>
+        <p:nvSpPr>
+          <p:cNvPr id="5" name="Нижний колонтитул 4"/>
+          <p:cNvSpPr>
+            <a:spLocks noGrp="1"/>
+          </p:cNvSpPr>
+          <p:nvPr>
+            <p:ph type="ftr" sz="quarter" idx="11"/>
+          </p:nvPr>
+        </p:nvSpPr>
+        <p:spPr/>
+        <p:txBody>
+          <a:bodyPr/>
+          <a:lstStyle/>
+          <a:p>
+            <a:r>
+              <a:rPr lang="ru-RU" smtClean="0"/>
+              <a:t>Ваганов Михаил Викторович  ASP.NET MVC + Oracle Database</a:t>
+            </a:r>
+            <a:endParaRPr lang="en-GB"/>
+          </a:p>
+        </p:txBody>
+      </p:sp>
+      <p:sp>
+        <p:nvSpPr>
+          <p:cNvPr id="6" name="Номер слайда 5"/>
+          <p:cNvSpPr>
+            <a:spLocks noGrp="1"/>
+          </p:cNvSpPr>
+          <p:nvPr>
+            <p:ph type="sldNum" sz="quarter" idx="12"/>
+          </p:nvPr>
+        </p:nvSpPr>
+        <p:spPr/>
+        <p:txBody>
+          <a:bodyPr/>
+          <a:lstStyle/>
+          <a:p>
+            <a:fld id="{8FD3F87F-7A79-4F3D-8F12-CD11A20D067D}" type="slidenum">
+              <a:rPr lang="en-GB" smtClean="0"/>
+              <a:t>18</a:t>
+            </a:fld>
+            <a:endParaRPr lang="en-GB"/>
+          </a:p>
+        </p:txBody>
+      </p:sp>
+      <p:grpSp>
+        <p:nvGrpSpPr>
+          <p:cNvPr id="19" name="Группа 18"/>
+          <p:cNvGrpSpPr/>
+          <p:nvPr/>
+        </p:nvGrpSpPr>
+        <p:grpSpPr>
+          <a:xfrm>
+            <a:off x="3315393" y="2103880"/>
+            <a:ext cx="6480463" cy="2996833"/>
+            <a:chOff x="3315393" y="2103880"/>
+            <a:chExt cx="6480463" cy="2996833"/>
+          </a:xfrm>
+        </p:grpSpPr>
+        <p:sp>
+          <p:nvSpPr>
+            <p:cNvPr id="7" name="Прямоугольник 6"/>
+            <p:cNvSpPr/>
+            <p:nvPr/>
+          </p:nvSpPr>
+          <p:spPr>
+            <a:xfrm>
+              <a:off x="3315393" y="2103880"/>
+              <a:ext cx="2370513" cy="842442"/>
+            </a:xfrm>
+            <a:prstGeom prst="rect">
+              <a:avLst/>
+            </a:prstGeom>
+          </p:spPr>
+          <p:style>
+            <a:lnRef idx="3">
+              <a:schemeClr val="lt1"/>
+            </a:lnRef>
+            <a:fillRef idx="1">
+              <a:schemeClr val="accent1"/>
+            </a:fillRef>
+            <a:effectRef idx="1">
+              <a:schemeClr val="accent1"/>
+            </a:effectRef>
+            <a:fontRef idx="minor">
+              <a:schemeClr val="lt1"/>
+            </a:fontRef>
+          </p:style>
+          <p:txBody>
+            <a:bodyPr rtlCol="0" anchor="ctr"/>
+            <a:lstStyle/>
+            <a:p>
+              <a:pPr algn="ctr"/>
+              <a:r>
+                <a:rPr lang="ru-RU" sz="2400" dirty="0" smtClean="0"/>
+                <a:t>Пользователь 1</a:t>
+              </a:r>
+              <a:endParaRPr lang="en-GB" sz="2400" dirty="0"/>
+            </a:p>
+          </p:txBody>
+        </p:sp>
+        <p:sp>
+          <p:nvSpPr>
+            <p:cNvPr id="8" name="Прямоугольник 7"/>
+            <p:cNvSpPr/>
+            <p:nvPr/>
+          </p:nvSpPr>
+          <p:spPr>
+            <a:xfrm>
+              <a:off x="7425343" y="2103880"/>
+              <a:ext cx="2370513" cy="842441"/>
+            </a:xfrm>
+            <a:prstGeom prst="rect">
+              <a:avLst/>
+            </a:prstGeom>
+          </p:spPr>
+          <p:style>
+            <a:lnRef idx="3">
+              <a:schemeClr val="lt1"/>
+            </a:lnRef>
+            <a:fillRef idx="1">
+              <a:schemeClr val="accent6"/>
+            </a:fillRef>
+            <a:effectRef idx="1">
+              <a:schemeClr val="accent6"/>
+            </a:effectRef>
+            <a:fontRef idx="minor">
+              <a:schemeClr val="lt1"/>
+            </a:fontRef>
+          </p:style>
+          <p:txBody>
+            <a:bodyPr rtlCol="0" anchor="ctr"/>
+            <a:lstStyle/>
+            <a:p>
+              <a:pPr algn="ctr"/>
+              <a:r>
+                <a:rPr lang="ru-RU" sz="2400" dirty="0" smtClean="0"/>
+                <a:t>Паспорт 1</a:t>
+              </a:r>
+              <a:endParaRPr lang="en-GB" sz="2400" dirty="0"/>
+            </a:p>
+          </p:txBody>
+        </p:sp>
+        <p:sp>
+          <p:nvSpPr>
+            <p:cNvPr id="11" name="Прямоугольник 10"/>
+            <p:cNvSpPr/>
+            <p:nvPr/>
+          </p:nvSpPr>
+          <p:spPr>
+            <a:xfrm>
+              <a:off x="3315393" y="3181076"/>
+              <a:ext cx="2370513" cy="842442"/>
+            </a:xfrm>
+            <a:prstGeom prst="rect">
+              <a:avLst/>
+            </a:prstGeom>
+          </p:spPr>
+          <p:style>
+            <a:lnRef idx="3">
+              <a:schemeClr val="lt1"/>
+            </a:lnRef>
+            <a:fillRef idx="1">
+              <a:schemeClr val="accent1"/>
+            </a:fillRef>
+            <a:effectRef idx="1">
+              <a:schemeClr val="accent1"/>
+            </a:effectRef>
+            <a:fontRef idx="minor">
+              <a:schemeClr val="lt1"/>
+            </a:fontRef>
+          </p:style>
+          <p:txBody>
+            <a:bodyPr rtlCol="0" anchor="ctr"/>
+            <a:lstStyle/>
+            <a:p>
+              <a:pPr algn="ctr"/>
+              <a:r>
+                <a:rPr lang="ru-RU" sz="2400" dirty="0" smtClean="0"/>
+                <a:t>Пользователь 2</a:t>
+              </a:r>
+              <a:endParaRPr lang="en-GB" sz="2400" dirty="0"/>
+            </a:p>
+          </p:txBody>
+        </p:sp>
+        <p:sp>
+          <p:nvSpPr>
+            <p:cNvPr id="12" name="Прямоугольник 11"/>
+            <p:cNvSpPr/>
+            <p:nvPr/>
+          </p:nvSpPr>
+          <p:spPr>
+            <a:xfrm>
+              <a:off x="7425343" y="3181076"/>
+              <a:ext cx="2370513" cy="842441"/>
+            </a:xfrm>
+            <a:prstGeom prst="rect">
+              <a:avLst/>
+            </a:prstGeom>
+          </p:spPr>
+          <p:style>
+            <a:lnRef idx="3">
+              <a:schemeClr val="lt1"/>
+            </a:lnRef>
+            <a:fillRef idx="1">
+              <a:schemeClr val="accent6"/>
+            </a:fillRef>
+            <a:effectRef idx="1">
+              <a:schemeClr val="accent6"/>
+            </a:effectRef>
+            <a:fontRef idx="minor">
+              <a:schemeClr val="lt1"/>
+            </a:fontRef>
+          </p:style>
+          <p:txBody>
+            <a:bodyPr rtlCol="0" anchor="ctr"/>
+            <a:lstStyle/>
+            <a:p>
+              <a:pPr algn="ctr"/>
+              <a:r>
+                <a:rPr lang="ru-RU" sz="2400" dirty="0" smtClean="0"/>
+                <a:t>Паспорт 2</a:t>
+              </a:r>
+              <a:endParaRPr lang="en-GB" sz="2400" dirty="0"/>
+            </a:p>
+          </p:txBody>
+        </p:sp>
+        <p:sp>
+          <p:nvSpPr>
+            <p:cNvPr id="13" name="Прямоугольник 12"/>
+            <p:cNvSpPr/>
+            <p:nvPr/>
+          </p:nvSpPr>
+          <p:spPr>
+            <a:xfrm>
+              <a:off x="3315393" y="4258271"/>
+              <a:ext cx="2370513" cy="842442"/>
+            </a:xfrm>
+            <a:prstGeom prst="rect">
+              <a:avLst/>
+            </a:prstGeom>
+          </p:spPr>
+          <p:style>
+            <a:lnRef idx="3">
+              <a:schemeClr val="lt1"/>
+            </a:lnRef>
+            <a:fillRef idx="1">
+              <a:schemeClr val="accent1"/>
+            </a:fillRef>
+            <a:effectRef idx="1">
+              <a:schemeClr val="accent1"/>
+            </a:effectRef>
+            <a:fontRef idx="minor">
+              <a:schemeClr val="lt1"/>
+            </a:fontRef>
+          </p:style>
+          <p:txBody>
+            <a:bodyPr rtlCol="0" anchor="ctr"/>
+            <a:lstStyle/>
+            <a:p>
+              <a:pPr algn="ctr"/>
+              <a:r>
+                <a:rPr lang="ru-RU" sz="2400" dirty="0" smtClean="0"/>
+                <a:t>Пользователь 3</a:t>
+              </a:r>
+              <a:endParaRPr lang="en-GB" sz="2400" dirty="0"/>
+            </a:p>
+          </p:txBody>
+        </p:sp>
+        <p:sp>
+          <p:nvSpPr>
+            <p:cNvPr id="14" name="Прямоугольник 13"/>
+            <p:cNvSpPr/>
+            <p:nvPr/>
+          </p:nvSpPr>
+          <p:spPr>
+            <a:xfrm>
+              <a:off x="7425343" y="4258271"/>
+              <a:ext cx="2370513" cy="842441"/>
+            </a:xfrm>
+            <a:prstGeom prst="rect">
+              <a:avLst/>
+            </a:prstGeom>
+          </p:spPr>
+          <p:style>
+            <a:lnRef idx="3">
+              <a:schemeClr val="lt1"/>
+            </a:lnRef>
+            <a:fillRef idx="1">
+              <a:schemeClr val="accent6"/>
+            </a:fillRef>
+            <a:effectRef idx="1">
+              <a:schemeClr val="accent6"/>
+            </a:effectRef>
+            <a:fontRef idx="minor">
+              <a:schemeClr val="lt1"/>
+            </a:fontRef>
+          </p:style>
+          <p:txBody>
+            <a:bodyPr rtlCol="0" anchor="ctr"/>
+            <a:lstStyle/>
+            <a:p>
+              <a:pPr algn="ctr"/>
+              <a:r>
+                <a:rPr lang="ru-RU" sz="2400" dirty="0" smtClean="0"/>
+                <a:t>Паспорт 3</a:t>
+              </a:r>
+              <a:endParaRPr lang="en-GB" sz="2400" dirty="0"/>
+            </a:p>
+          </p:txBody>
+        </p:sp>
+        <p:sp>
+          <p:nvSpPr>
+            <p:cNvPr id="15" name="Стрелка вправо 14"/>
+            <p:cNvSpPr/>
+            <p:nvPr/>
+          </p:nvSpPr>
+          <p:spPr>
+            <a:xfrm>
+              <a:off x="5785658" y="2301149"/>
+              <a:ext cx="1539932" cy="448887"/>
+            </a:xfrm>
+            <a:prstGeom prst="rightArrow">
+              <a:avLst/>
+            </a:prstGeom>
+          </p:spPr>
+          <p:style>
+            <a:lnRef idx="2">
+              <a:schemeClr val="accent5">
+                <a:shade val="50000"/>
+              </a:schemeClr>
+            </a:lnRef>
+            <a:fillRef idx="1">
+              <a:schemeClr val="accent5"/>
+            </a:fillRef>
+            <a:effectRef idx="0">
+              <a:schemeClr val="accent5"/>
+            </a:effectRef>
+            <a:fontRef idx="minor">
+              <a:schemeClr val="lt1"/>
+            </a:fontRef>
+          </p:style>
+          <p:txBody>
+            <a:bodyPr rtlCol="0" anchor="ctr"/>
+            <a:lstStyle/>
+            <a:p>
+              <a:pPr algn="ctr"/>
+              <a:endParaRPr lang="en-GB" sz="2400"/>
+            </a:p>
+          </p:txBody>
+        </p:sp>
+        <p:sp>
+          <p:nvSpPr>
+            <p:cNvPr id="16" name="Стрелка вправо 15"/>
+            <p:cNvSpPr/>
+            <p:nvPr/>
+          </p:nvSpPr>
+          <p:spPr>
+            <a:xfrm>
+              <a:off x="5785658" y="3378098"/>
+              <a:ext cx="1539932" cy="448887"/>
+            </a:xfrm>
+            <a:prstGeom prst="rightArrow">
+              <a:avLst/>
+            </a:prstGeom>
+          </p:spPr>
+          <p:style>
+            <a:lnRef idx="2">
+              <a:schemeClr val="accent5">
+                <a:shade val="50000"/>
+              </a:schemeClr>
+            </a:lnRef>
+            <a:fillRef idx="1">
+              <a:schemeClr val="accent5"/>
+            </a:fillRef>
+            <a:effectRef idx="0">
+              <a:schemeClr val="accent5"/>
+            </a:effectRef>
+            <a:fontRef idx="minor">
+              <a:schemeClr val="lt1"/>
+            </a:fontRef>
+          </p:style>
+          <p:txBody>
+            <a:bodyPr rtlCol="0" anchor="ctr"/>
+            <a:lstStyle/>
+            <a:p>
+              <a:pPr algn="ctr"/>
+              <a:endParaRPr lang="en-GB" sz="2400"/>
+            </a:p>
+          </p:txBody>
+        </p:sp>
+        <p:sp>
+          <p:nvSpPr>
+            <p:cNvPr id="17" name="Стрелка вправо 16"/>
+            <p:cNvSpPr/>
+            <p:nvPr/>
+          </p:nvSpPr>
+          <p:spPr>
+            <a:xfrm>
+              <a:off x="5785658" y="4455047"/>
+              <a:ext cx="1539932" cy="448887"/>
+            </a:xfrm>
+            <a:prstGeom prst="rightArrow">
+              <a:avLst/>
+            </a:prstGeom>
+          </p:spPr>
+          <p:style>
+            <a:lnRef idx="2">
+              <a:schemeClr val="accent5">
+                <a:shade val="50000"/>
+              </a:schemeClr>
+            </a:lnRef>
+            <a:fillRef idx="1">
+              <a:schemeClr val="accent5"/>
+            </a:fillRef>
+            <a:effectRef idx="0">
+              <a:schemeClr val="accent5"/>
+            </a:effectRef>
+            <a:fontRef idx="minor">
+              <a:schemeClr val="lt1"/>
+            </a:fontRef>
+          </p:style>
+          <p:txBody>
+            <a:bodyPr rtlCol="0" anchor="ctr"/>
+            <a:lstStyle/>
+            <a:p>
+              <a:pPr algn="ctr"/>
+              <a:endParaRPr lang="en-GB" sz="2400"/>
+            </a:p>
+          </p:txBody>
+        </p:sp>
+      </p:grpSp>
+    </p:spTree>
+    <p:extLst>
+      <p:ext uri="{BB962C8B-B14F-4D97-AF65-F5344CB8AC3E}">
+        <p14:creationId xmlns:p14="http://schemas.microsoft.com/office/powerpoint/2010/main" val="1535319122"/>
+      </p:ext>
+    </p:extLst>
+  </p:cSld>
+  <p:clrMapOvr>
+    <a:masterClrMapping/>
+  </p:clrMapOvr>
+  <p:timing>
+    <p:tnLst>
+      <p:par>
+        <p:cTn id="1" dur="indefinite" restart="never" nodeType="tmRoot"/>
+      </p:par>
+    </p:tnLst>
+  </p:timing>
+</p:sld>
+</file>
+
+<file path=ppt/slides/slide19.xml><?xml version="1.0" encoding="utf-8"?>
+<p:sld xmlns:a="http://schemas.openxmlformats.org/drawingml/2006/main" xmlns:r="http://schemas.openxmlformats.org/officeDocument/2006/relationships" xmlns:p="http://schemas.openxmlformats.org/presentationml/2006/main">
+  <p:cSld>
+    <p:spTree>
+      <p:nvGrpSpPr>
+        <p:cNvPr id="1" name=""/>
+        <p:cNvGrpSpPr/>
+        <p:nvPr/>
+      </p:nvGrpSpPr>
+      <p:grpSpPr>
+        <a:xfrm>
+          <a:off x="0" y="0"/>
+          <a:ext cx="0" cy="0"/>
+          <a:chOff x="0" y="0"/>
+          <a:chExt cx="0" cy="0"/>
+        </a:xfrm>
+      </p:grpSpPr>
+      <p:sp>
+        <p:nvSpPr>
+          <p:cNvPr id="2" name="Заголовок 1"/>
+          <p:cNvSpPr>
+            <a:spLocks noGrp="1"/>
+          </p:cNvSpPr>
+          <p:nvPr>
+            <p:ph type="title"/>
+          </p:nvPr>
+        </p:nvSpPr>
+        <p:spPr/>
+        <p:txBody>
+          <a:bodyPr/>
+          <a:lstStyle/>
+          <a:p>
+            <a:r>
+              <a:rPr lang="ru-RU" dirty="0"/>
+              <a:t>Отношение </a:t>
+            </a:r>
+            <a:r>
+              <a:rPr lang="en-US" dirty="0" smtClean="0"/>
+              <a:t>One-to-one</a:t>
+            </a:r>
+            <a:r>
+              <a:rPr lang="ru-RU" dirty="0" smtClean="0"/>
+              <a:t> (2)</a:t>
+            </a:r>
+            <a:endParaRPr lang="en-GB" dirty="0"/>
+          </a:p>
+        </p:txBody>
+      </p:sp>
+      <p:sp>
+        <p:nvSpPr>
+          <p:cNvPr id="4" name="Дата 3"/>
+          <p:cNvSpPr>
+            <a:spLocks noGrp="1"/>
+          </p:cNvSpPr>
+          <p:nvPr>
+            <p:ph type="dt" sz="half" idx="10"/>
+          </p:nvPr>
+        </p:nvSpPr>
+        <p:spPr/>
+        <p:txBody>
+          <a:bodyPr/>
+          <a:lstStyle/>
+          <a:p>
+            <a:r>
+              <a:rPr lang="en-US" smtClean="0"/>
+              <a:t>01.03.2016</a:t>
+            </a:r>
+            <a:endParaRPr lang="en-GB"/>
+          </a:p>
+        </p:txBody>
+      </p:sp>
+      <p:sp>
+        <p:nvSpPr>
+          <p:cNvPr id="5" name="Нижний колонтитул 4"/>
+          <p:cNvSpPr>
+            <a:spLocks noGrp="1"/>
+          </p:cNvSpPr>
+          <p:nvPr>
+            <p:ph type="ftr" sz="quarter" idx="11"/>
+          </p:nvPr>
+        </p:nvSpPr>
+        <p:spPr/>
+        <p:txBody>
+          <a:bodyPr/>
+          <a:lstStyle/>
+          <a:p>
+            <a:r>
+              <a:rPr lang="ru-RU" smtClean="0"/>
+              <a:t>Ваганов Михаил Викторович  ASP.NET MVC + Oracle Database</a:t>
+            </a:r>
+            <a:endParaRPr lang="en-GB"/>
+          </a:p>
+        </p:txBody>
+      </p:sp>
+      <p:sp>
+        <p:nvSpPr>
+          <p:cNvPr id="6" name="Номер слайда 5"/>
+          <p:cNvSpPr>
+            <a:spLocks noGrp="1"/>
+          </p:cNvSpPr>
+          <p:nvPr>
+            <p:ph type="sldNum" sz="quarter" idx="12"/>
+          </p:nvPr>
+        </p:nvSpPr>
+        <p:spPr/>
+        <p:txBody>
+          <a:bodyPr/>
+          <a:lstStyle/>
+          <a:p>
+            <a:fld id="{8FD3F87F-7A79-4F3D-8F12-CD11A20D067D}" type="slidenum">
+              <a:rPr lang="en-GB" smtClean="0"/>
+              <a:t>19</a:t>
+            </a:fld>
+            <a:endParaRPr lang="en-GB"/>
+          </a:p>
+        </p:txBody>
+      </p:sp>
+      <p:grpSp>
+        <p:nvGrpSpPr>
+          <p:cNvPr id="14" name="Группа 13"/>
+          <p:cNvGrpSpPr/>
+          <p:nvPr/>
+        </p:nvGrpSpPr>
+        <p:grpSpPr>
+          <a:xfrm>
+            <a:off x="1961804" y="2676698"/>
+            <a:ext cx="2294312" cy="1996903"/>
+            <a:chOff x="1961804" y="2676698"/>
+            <a:chExt cx="2294312" cy="1996903"/>
+          </a:xfrm>
+        </p:grpSpPr>
+        <p:sp>
+          <p:nvSpPr>
+            <p:cNvPr id="8" name="Прямоугольник 7"/>
+            <p:cNvSpPr/>
+            <p:nvPr/>
+          </p:nvSpPr>
+          <p:spPr>
+            <a:xfrm>
+              <a:off x="1961804" y="2676698"/>
+              <a:ext cx="2294312" cy="1996903"/>
+            </a:xfrm>
+            <a:prstGeom prst="rect">
+              <a:avLst/>
+            </a:prstGeom>
+          </p:spPr>
+          <p:style>
+            <a:lnRef idx="2">
+              <a:schemeClr val="dk1"/>
+            </a:lnRef>
+            <a:fillRef idx="1">
+              <a:schemeClr val="lt1"/>
+            </a:fillRef>
+            <a:effectRef idx="0">
+              <a:schemeClr val="dk1"/>
+            </a:effectRef>
+            <a:fontRef idx="minor">
+              <a:schemeClr val="dk1"/>
+            </a:fontRef>
+          </p:style>
+          <p:txBody>
+            <a:bodyPr rtlCol="0" anchor="t"/>
+            <a:lstStyle/>
+            <a:p>
+              <a:pPr algn="ctr"/>
+              <a:r>
+                <a:rPr lang="ru-RU" dirty="0" smtClean="0"/>
+                <a:t>Пользователь</a:t>
+              </a:r>
+              <a:endParaRPr lang="en-GB" dirty="0"/>
+            </a:p>
+          </p:txBody>
+        </p:sp>
+        <p:sp>
+          <p:nvSpPr>
+            <p:cNvPr id="13" name="Прямоугольник 12"/>
+            <p:cNvSpPr/>
+            <p:nvPr/>
+          </p:nvSpPr>
+          <p:spPr>
+            <a:xfrm>
+              <a:off x="1961804" y="3163297"/>
+              <a:ext cx="2294312" cy="1510304"/>
+            </a:xfrm>
+            <a:prstGeom prst="rect">
+              <a:avLst/>
+            </a:prstGeom>
+          </p:spPr>
+          <p:style>
+            <a:lnRef idx="2">
+              <a:schemeClr val="dk1"/>
+            </a:lnRef>
+            <a:fillRef idx="1">
+              <a:schemeClr val="lt1"/>
+            </a:fillRef>
+            <a:effectRef idx="0">
+              <a:schemeClr val="dk1"/>
+            </a:effectRef>
+            <a:fontRef idx="minor">
+              <a:schemeClr val="dk1"/>
+            </a:fontRef>
+          </p:style>
+          <p:txBody>
+            <a:bodyPr rtlCol="0" anchor="ctr"/>
+            <a:lstStyle/>
+            <a:p>
+              <a:pPr algn="ctr"/>
+              <a:endParaRPr lang="en-GB"/>
+            </a:p>
+          </p:txBody>
+        </p:sp>
+      </p:grpSp>
+      <p:grpSp>
+        <p:nvGrpSpPr>
+          <p:cNvPr id="15" name="Группа 14"/>
+          <p:cNvGrpSpPr/>
+          <p:nvPr/>
+        </p:nvGrpSpPr>
+        <p:grpSpPr>
+          <a:xfrm>
+            <a:off x="6096000" y="2676697"/>
+            <a:ext cx="2294312" cy="1996903"/>
+            <a:chOff x="1961804" y="2676698"/>
+            <a:chExt cx="2294312" cy="1996903"/>
+          </a:xfrm>
+        </p:grpSpPr>
+        <p:sp>
+          <p:nvSpPr>
+            <p:cNvPr id="16" name="Прямоугольник 15"/>
+            <p:cNvSpPr/>
+            <p:nvPr/>
+          </p:nvSpPr>
+          <p:spPr>
+            <a:xfrm>
+              <a:off x="1961804" y="2676698"/>
+              <a:ext cx="2294312" cy="1996903"/>
+            </a:xfrm>
+            <a:prstGeom prst="rect">
+              <a:avLst/>
+            </a:prstGeom>
+          </p:spPr>
+          <p:style>
+            <a:lnRef idx="2">
+              <a:schemeClr val="dk1"/>
+            </a:lnRef>
+            <a:fillRef idx="1">
+              <a:schemeClr val="lt1"/>
+            </a:fillRef>
+            <a:effectRef idx="0">
+              <a:schemeClr val="dk1"/>
+            </a:effectRef>
+            <a:fontRef idx="minor">
+              <a:schemeClr val="dk1"/>
+            </a:fontRef>
+          </p:style>
+          <p:txBody>
+            <a:bodyPr rtlCol="0" anchor="t"/>
+            <a:lstStyle/>
+            <a:p>
+              <a:pPr algn="ctr"/>
+              <a:r>
+                <a:rPr lang="ru-RU" dirty="0" smtClean="0"/>
+                <a:t>Паспорт</a:t>
+              </a:r>
+              <a:endParaRPr lang="en-GB" dirty="0"/>
+            </a:p>
+          </p:txBody>
+        </p:sp>
+        <p:sp>
+          <p:nvSpPr>
+            <p:cNvPr id="17" name="Прямоугольник 16"/>
+            <p:cNvSpPr/>
+            <p:nvPr/>
+          </p:nvSpPr>
+          <p:spPr>
+            <a:xfrm>
+              <a:off x="1961804" y="3163297"/>
+              <a:ext cx="2294312" cy="1510304"/>
+            </a:xfrm>
+            <a:prstGeom prst="rect">
+              <a:avLst/>
+            </a:prstGeom>
+          </p:spPr>
+          <p:style>
+            <a:lnRef idx="2">
+              <a:schemeClr val="dk1"/>
+            </a:lnRef>
+            <a:fillRef idx="1">
+              <a:schemeClr val="lt1"/>
+            </a:fillRef>
+            <a:effectRef idx="0">
+              <a:schemeClr val="dk1"/>
+            </a:effectRef>
+            <a:fontRef idx="minor">
+              <a:schemeClr val="dk1"/>
+            </a:fontRef>
+          </p:style>
+          <p:txBody>
+            <a:bodyPr rtlCol="0" anchor="ctr"/>
+            <a:lstStyle/>
+            <a:p>
+              <a:pPr algn="ctr"/>
+              <a:endParaRPr lang="en-GB"/>
+            </a:p>
+          </p:txBody>
+        </p:sp>
+      </p:grpSp>
+      <p:cxnSp>
+        <p:nvCxnSpPr>
+          <p:cNvPr id="19" name="Прямая со стрелкой 18"/>
+          <p:cNvCxnSpPr>
+            <a:stCxn id="8" idx="3"/>
+          </p:cNvCxnSpPr>
+          <p:nvPr/>
+        </p:nvCxnSpPr>
+        <p:spPr>
+          <a:xfrm flipV="1">
+            <a:off x="4256116" y="3675148"/>
+            <a:ext cx="1839884" cy="2"/>
+          </a:xfrm>
+          <a:prstGeom prst="straightConnector1">
+            <a:avLst/>
+          </a:prstGeom>
+          <a:ln>
+            <a:tailEnd type="triangle"/>
+          </a:ln>
+        </p:spPr>
+        <p:style>
+          <a:lnRef idx="1">
+            <a:schemeClr val="dk1"/>
+          </a:lnRef>
+          <a:fillRef idx="0">
+            <a:schemeClr val="dk1"/>
+          </a:fillRef>
+          <a:effectRef idx="0">
+            <a:schemeClr val="dk1"/>
+          </a:effectRef>
+          <a:fontRef idx="minor">
+            <a:schemeClr val="tx1"/>
+          </a:fontRef>
+        </p:style>
+      </p:cxnSp>
+      <p:sp>
+        <p:nvSpPr>
+          <p:cNvPr id="20" name="TextBox 19"/>
+          <p:cNvSpPr txBox="1"/>
+          <p:nvPr/>
+        </p:nvSpPr>
+        <p:spPr>
+          <a:xfrm>
+            <a:off x="4256116" y="3305816"/>
+            <a:ext cx="301686" cy="369332"/>
+          </a:xfrm>
+          <a:prstGeom prst="rect">
+            <a:avLst/>
+          </a:prstGeom>
+          <a:noFill/>
+        </p:spPr>
+        <p:txBody>
+          <a:bodyPr wrap="none" rtlCol="0">
+            <a:spAutoFit/>
+          </a:bodyPr>
+          <a:lstStyle/>
+          <a:p>
+            <a:r>
+              <a:rPr lang="ru-RU" dirty="0" smtClean="0"/>
+              <a:t>1</a:t>
+            </a:r>
+            <a:endParaRPr lang="en-GB" dirty="0"/>
+          </a:p>
+        </p:txBody>
+      </p:sp>
+      <p:sp>
+        <p:nvSpPr>
+          <p:cNvPr id="21" name="TextBox 20"/>
+          <p:cNvSpPr txBox="1"/>
+          <p:nvPr/>
+        </p:nvSpPr>
+        <p:spPr>
+          <a:xfrm>
+            <a:off x="5794314" y="3305816"/>
+            <a:ext cx="301686" cy="369332"/>
+          </a:xfrm>
+          <a:prstGeom prst="rect">
+            <a:avLst/>
+          </a:prstGeom>
+          <a:noFill/>
+        </p:spPr>
+        <p:txBody>
+          <a:bodyPr wrap="none" rtlCol="0">
+            <a:spAutoFit/>
+          </a:bodyPr>
+          <a:lstStyle/>
+          <a:p>
+            <a:r>
+              <a:rPr lang="ru-RU" dirty="0" smtClean="0"/>
+              <a:t>1</a:t>
+            </a:r>
+            <a:endParaRPr lang="en-GB" dirty="0"/>
+          </a:p>
+        </p:txBody>
+      </p:sp>
+    </p:spTree>
+    <p:extLst>
+      <p:ext uri="{BB962C8B-B14F-4D97-AF65-F5344CB8AC3E}">
+        <p14:creationId xmlns:p14="http://schemas.microsoft.com/office/powerpoint/2010/main" val="520702328"/>
       </p:ext>
     </p:extLst>
   </p:cSld>
@@ -4153,7 +6227,7 @@
           <a:p>
             <a:r>
               <a:rPr lang="ru-RU" dirty="0" smtClean="0"/>
-              <a:t>Цель занятия</a:t>
+              <a:t>Задача курса</a:t>
             </a:r>
             <a:endParaRPr lang="en-GB" dirty="0"/>
           </a:p>
@@ -4174,19 +6248,7 @@
           <a:bodyPr/>
           <a:lstStyle/>
           <a:p>
-            <a:r>
-              <a:rPr lang="ru-RU" dirty="0" smtClean="0"/>
-              <a:t>Научиться использовать </a:t>
-            </a:r>
-            <a:r>
-              <a:rPr lang="en-US" dirty="0" smtClean="0"/>
-              <a:t>Entity Framework </a:t>
-            </a:r>
-            <a:r>
-              <a:rPr lang="ru-RU" dirty="0" smtClean="0"/>
-              <a:t>для организации работы с базой данных</a:t>
-            </a:r>
-            <a:endParaRPr lang="en-GB" dirty="0"/>
+            <a:endParaRPr lang="en-GB"/>
           </a:p>
         </p:txBody>
       </p:sp>
@@ -4263,6 +6325,1873 @@
     <p:extLst>
       <p:ext uri="{BB962C8B-B14F-4D97-AF65-F5344CB8AC3E}">
         <p14:creationId xmlns:p14="http://schemas.microsoft.com/office/powerpoint/2010/main" val="3479960687"/>
+      </p:ext>
+    </p:extLst>
+  </p:cSld>
+  <p:clrMapOvr>
+    <a:masterClrMapping/>
+  </p:clrMapOvr>
+  <p:timing>
+    <p:tnLst>
+      <p:par>
+        <p:cTn id="1" dur="indefinite" restart="never" nodeType="tmRoot"/>
+      </p:par>
+    </p:tnLst>
+  </p:timing>
+</p:sld>
+</file>
+
+<file path=ppt/slides/slide20.xml><?xml version="1.0" encoding="utf-8"?>
+<p:sld xmlns:a="http://schemas.openxmlformats.org/drawingml/2006/main" xmlns:r="http://schemas.openxmlformats.org/officeDocument/2006/relationships" xmlns:p="http://schemas.openxmlformats.org/presentationml/2006/main">
+  <p:cSld>
+    <p:spTree>
+      <p:nvGrpSpPr>
+        <p:cNvPr id="1" name=""/>
+        <p:cNvGrpSpPr/>
+        <p:nvPr/>
+      </p:nvGrpSpPr>
+      <p:grpSpPr>
+        <a:xfrm>
+          <a:off x="0" y="0"/>
+          <a:ext cx="0" cy="0"/>
+          <a:chOff x="0" y="0"/>
+          <a:chExt cx="0" cy="0"/>
+        </a:xfrm>
+      </p:grpSpPr>
+      <p:sp>
+        <p:nvSpPr>
+          <p:cNvPr id="2" name="Заголовок 1"/>
+          <p:cNvSpPr>
+            <a:spLocks noGrp="1"/>
+          </p:cNvSpPr>
+          <p:nvPr>
+            <p:ph type="title"/>
+          </p:nvPr>
+        </p:nvSpPr>
+        <p:spPr/>
+        <p:txBody>
+          <a:bodyPr/>
+          <a:lstStyle/>
+          <a:p>
+            <a:r>
+              <a:rPr lang="ru-RU" dirty="0" smtClean="0"/>
+              <a:t>Отношение </a:t>
+            </a:r>
+            <a:r>
+              <a:rPr lang="en-US" dirty="0" smtClean="0"/>
+              <a:t>one-to-many</a:t>
+            </a:r>
+            <a:endParaRPr lang="en-GB" dirty="0"/>
+          </a:p>
+        </p:txBody>
+      </p:sp>
+      <p:sp>
+        <p:nvSpPr>
+          <p:cNvPr id="4" name="Дата 3"/>
+          <p:cNvSpPr>
+            <a:spLocks noGrp="1"/>
+          </p:cNvSpPr>
+          <p:nvPr>
+            <p:ph type="dt" sz="half" idx="10"/>
+          </p:nvPr>
+        </p:nvSpPr>
+        <p:spPr/>
+        <p:txBody>
+          <a:bodyPr/>
+          <a:lstStyle/>
+          <a:p>
+            <a:r>
+              <a:rPr lang="en-US" smtClean="0"/>
+              <a:t>01.03.2016</a:t>
+            </a:r>
+            <a:endParaRPr lang="en-GB"/>
+          </a:p>
+        </p:txBody>
+      </p:sp>
+      <p:sp>
+        <p:nvSpPr>
+          <p:cNvPr id="5" name="Нижний колонтитул 4"/>
+          <p:cNvSpPr>
+            <a:spLocks noGrp="1"/>
+          </p:cNvSpPr>
+          <p:nvPr>
+            <p:ph type="ftr" sz="quarter" idx="11"/>
+          </p:nvPr>
+        </p:nvSpPr>
+        <p:spPr/>
+        <p:txBody>
+          <a:bodyPr/>
+          <a:lstStyle/>
+          <a:p>
+            <a:r>
+              <a:rPr lang="ru-RU" smtClean="0"/>
+              <a:t>Ваганов Михаил Викторович  ASP.NET MVC + Oracle Database</a:t>
+            </a:r>
+            <a:endParaRPr lang="en-GB"/>
+          </a:p>
+        </p:txBody>
+      </p:sp>
+      <p:sp>
+        <p:nvSpPr>
+          <p:cNvPr id="6" name="Номер слайда 5"/>
+          <p:cNvSpPr>
+            <a:spLocks noGrp="1"/>
+          </p:cNvSpPr>
+          <p:nvPr>
+            <p:ph type="sldNum" sz="quarter" idx="12"/>
+          </p:nvPr>
+        </p:nvSpPr>
+        <p:spPr/>
+        <p:txBody>
+          <a:bodyPr/>
+          <a:lstStyle/>
+          <a:p>
+            <a:fld id="{8FD3F87F-7A79-4F3D-8F12-CD11A20D067D}" type="slidenum">
+              <a:rPr lang="en-GB" smtClean="0"/>
+              <a:t>20</a:t>
+            </a:fld>
+            <a:endParaRPr lang="en-GB"/>
+          </a:p>
+        </p:txBody>
+      </p:sp>
+      <p:grpSp>
+        <p:nvGrpSpPr>
+          <p:cNvPr id="16" name="Группа 15"/>
+          <p:cNvGrpSpPr/>
+          <p:nvPr/>
+        </p:nvGrpSpPr>
+        <p:grpSpPr>
+          <a:xfrm>
+            <a:off x="2855768" y="2103881"/>
+            <a:ext cx="6480463" cy="2996833"/>
+            <a:chOff x="2858193" y="2120507"/>
+            <a:chExt cx="6480463" cy="2996833"/>
+          </a:xfrm>
+        </p:grpSpPr>
+        <p:sp>
+          <p:nvSpPr>
+            <p:cNvPr id="7" name="Прямоугольник 6"/>
+            <p:cNvSpPr/>
+            <p:nvPr/>
+          </p:nvSpPr>
+          <p:spPr>
+            <a:xfrm>
+              <a:off x="2858193" y="2120507"/>
+              <a:ext cx="2370513" cy="842442"/>
+            </a:xfrm>
+            <a:prstGeom prst="rect">
+              <a:avLst/>
+            </a:prstGeom>
+          </p:spPr>
+          <p:style>
+            <a:lnRef idx="3">
+              <a:schemeClr val="lt1"/>
+            </a:lnRef>
+            <a:fillRef idx="1">
+              <a:schemeClr val="accent1"/>
+            </a:fillRef>
+            <a:effectRef idx="1">
+              <a:schemeClr val="accent1"/>
+            </a:effectRef>
+            <a:fontRef idx="minor">
+              <a:schemeClr val="lt1"/>
+            </a:fontRef>
+          </p:style>
+          <p:txBody>
+            <a:bodyPr rtlCol="0" anchor="ctr"/>
+            <a:lstStyle/>
+            <a:p>
+              <a:pPr algn="ctr"/>
+              <a:r>
+                <a:rPr lang="ru-RU" sz="2400" dirty="0" smtClean="0"/>
+                <a:t>Пользователь 1</a:t>
+              </a:r>
+              <a:endParaRPr lang="en-GB" sz="2400" dirty="0"/>
+            </a:p>
+          </p:txBody>
+        </p:sp>
+        <p:sp>
+          <p:nvSpPr>
+            <p:cNvPr id="8" name="Прямоугольник 7"/>
+            <p:cNvSpPr/>
+            <p:nvPr/>
+          </p:nvSpPr>
+          <p:spPr>
+            <a:xfrm>
+              <a:off x="6968143" y="2120507"/>
+              <a:ext cx="2370513" cy="1919638"/>
+            </a:xfrm>
+            <a:prstGeom prst="rect">
+              <a:avLst/>
+            </a:prstGeom>
+          </p:spPr>
+          <p:style>
+            <a:lnRef idx="3">
+              <a:schemeClr val="lt1"/>
+            </a:lnRef>
+            <a:fillRef idx="1">
+              <a:schemeClr val="accent6"/>
+            </a:fillRef>
+            <a:effectRef idx="1">
+              <a:schemeClr val="accent6"/>
+            </a:effectRef>
+            <a:fontRef idx="minor">
+              <a:schemeClr val="lt1"/>
+            </a:fontRef>
+          </p:style>
+          <p:txBody>
+            <a:bodyPr rtlCol="0" anchor="ctr"/>
+            <a:lstStyle/>
+            <a:p>
+              <a:pPr algn="ctr"/>
+              <a:r>
+                <a:rPr lang="ru-RU" sz="2400" dirty="0" smtClean="0"/>
+                <a:t>Адрес 1</a:t>
+              </a:r>
+              <a:endParaRPr lang="en-GB" sz="2400" dirty="0"/>
+            </a:p>
+          </p:txBody>
+        </p:sp>
+        <p:sp>
+          <p:nvSpPr>
+            <p:cNvPr id="9" name="Прямоугольник 8"/>
+            <p:cNvSpPr/>
+            <p:nvPr/>
+          </p:nvSpPr>
+          <p:spPr>
+            <a:xfrm>
+              <a:off x="2858193" y="3197703"/>
+              <a:ext cx="2370513" cy="842442"/>
+            </a:xfrm>
+            <a:prstGeom prst="rect">
+              <a:avLst/>
+            </a:prstGeom>
+          </p:spPr>
+          <p:style>
+            <a:lnRef idx="3">
+              <a:schemeClr val="lt1"/>
+            </a:lnRef>
+            <a:fillRef idx="1">
+              <a:schemeClr val="accent1"/>
+            </a:fillRef>
+            <a:effectRef idx="1">
+              <a:schemeClr val="accent1"/>
+            </a:effectRef>
+            <a:fontRef idx="minor">
+              <a:schemeClr val="lt1"/>
+            </a:fontRef>
+          </p:style>
+          <p:txBody>
+            <a:bodyPr rtlCol="0" anchor="ctr"/>
+            <a:lstStyle/>
+            <a:p>
+              <a:pPr algn="ctr"/>
+              <a:r>
+                <a:rPr lang="ru-RU" sz="2400" dirty="0" smtClean="0"/>
+                <a:t>Пользователь 2</a:t>
+              </a:r>
+              <a:endParaRPr lang="en-GB" sz="2400" dirty="0"/>
+            </a:p>
+          </p:txBody>
+        </p:sp>
+        <p:sp>
+          <p:nvSpPr>
+            <p:cNvPr id="11" name="Прямоугольник 10"/>
+            <p:cNvSpPr/>
+            <p:nvPr/>
+          </p:nvSpPr>
+          <p:spPr>
+            <a:xfrm>
+              <a:off x="2858193" y="4274898"/>
+              <a:ext cx="2370513" cy="842442"/>
+            </a:xfrm>
+            <a:prstGeom prst="rect">
+              <a:avLst/>
+            </a:prstGeom>
+          </p:spPr>
+          <p:style>
+            <a:lnRef idx="3">
+              <a:schemeClr val="lt1"/>
+            </a:lnRef>
+            <a:fillRef idx="1">
+              <a:schemeClr val="accent1"/>
+            </a:fillRef>
+            <a:effectRef idx="1">
+              <a:schemeClr val="accent1"/>
+            </a:effectRef>
+            <a:fontRef idx="minor">
+              <a:schemeClr val="lt1"/>
+            </a:fontRef>
+          </p:style>
+          <p:txBody>
+            <a:bodyPr rtlCol="0" anchor="ctr"/>
+            <a:lstStyle/>
+            <a:p>
+              <a:pPr algn="ctr"/>
+              <a:r>
+                <a:rPr lang="ru-RU" sz="2400" dirty="0" smtClean="0"/>
+                <a:t>Пользователь 3</a:t>
+              </a:r>
+              <a:endParaRPr lang="en-GB" sz="2400" dirty="0"/>
+            </a:p>
+          </p:txBody>
+        </p:sp>
+        <p:sp>
+          <p:nvSpPr>
+            <p:cNvPr id="12" name="Прямоугольник 11"/>
+            <p:cNvSpPr/>
+            <p:nvPr/>
+          </p:nvSpPr>
+          <p:spPr>
+            <a:xfrm>
+              <a:off x="6968143" y="4274898"/>
+              <a:ext cx="2370513" cy="842441"/>
+            </a:xfrm>
+            <a:prstGeom prst="rect">
+              <a:avLst/>
+            </a:prstGeom>
+          </p:spPr>
+          <p:style>
+            <a:lnRef idx="3">
+              <a:schemeClr val="lt1"/>
+            </a:lnRef>
+            <a:fillRef idx="1">
+              <a:schemeClr val="accent6"/>
+            </a:fillRef>
+            <a:effectRef idx="1">
+              <a:schemeClr val="accent6"/>
+            </a:effectRef>
+            <a:fontRef idx="minor">
+              <a:schemeClr val="lt1"/>
+            </a:fontRef>
+          </p:style>
+          <p:txBody>
+            <a:bodyPr rtlCol="0" anchor="ctr"/>
+            <a:lstStyle/>
+            <a:p>
+              <a:pPr algn="ctr"/>
+              <a:r>
+                <a:rPr lang="ru-RU" sz="2400" dirty="0" smtClean="0"/>
+                <a:t>Адрес 2</a:t>
+              </a:r>
+              <a:endParaRPr lang="en-GB" sz="2400" dirty="0"/>
+            </a:p>
+          </p:txBody>
+        </p:sp>
+        <p:sp>
+          <p:nvSpPr>
+            <p:cNvPr id="13" name="Стрелка вправо 12"/>
+            <p:cNvSpPr/>
+            <p:nvPr/>
+          </p:nvSpPr>
+          <p:spPr>
+            <a:xfrm>
+              <a:off x="5328458" y="2317776"/>
+              <a:ext cx="1539932" cy="448887"/>
+            </a:xfrm>
+            <a:prstGeom prst="rightArrow">
+              <a:avLst/>
+            </a:prstGeom>
+          </p:spPr>
+          <p:style>
+            <a:lnRef idx="2">
+              <a:schemeClr val="accent5">
+                <a:shade val="50000"/>
+              </a:schemeClr>
+            </a:lnRef>
+            <a:fillRef idx="1">
+              <a:schemeClr val="accent5"/>
+            </a:fillRef>
+            <a:effectRef idx="0">
+              <a:schemeClr val="accent5"/>
+            </a:effectRef>
+            <a:fontRef idx="minor">
+              <a:schemeClr val="lt1"/>
+            </a:fontRef>
+          </p:style>
+          <p:txBody>
+            <a:bodyPr rtlCol="0" anchor="ctr"/>
+            <a:lstStyle/>
+            <a:p>
+              <a:pPr algn="ctr"/>
+              <a:endParaRPr lang="en-GB" sz="2400"/>
+            </a:p>
+          </p:txBody>
+        </p:sp>
+        <p:sp>
+          <p:nvSpPr>
+            <p:cNvPr id="14" name="Стрелка вправо 13"/>
+            <p:cNvSpPr/>
+            <p:nvPr/>
+          </p:nvSpPr>
+          <p:spPr>
+            <a:xfrm>
+              <a:off x="5328458" y="3394725"/>
+              <a:ext cx="1539932" cy="448887"/>
+            </a:xfrm>
+            <a:prstGeom prst="rightArrow">
+              <a:avLst/>
+            </a:prstGeom>
+          </p:spPr>
+          <p:style>
+            <a:lnRef idx="2">
+              <a:schemeClr val="accent5">
+                <a:shade val="50000"/>
+              </a:schemeClr>
+            </a:lnRef>
+            <a:fillRef idx="1">
+              <a:schemeClr val="accent5"/>
+            </a:fillRef>
+            <a:effectRef idx="0">
+              <a:schemeClr val="accent5"/>
+            </a:effectRef>
+            <a:fontRef idx="minor">
+              <a:schemeClr val="lt1"/>
+            </a:fontRef>
+          </p:style>
+          <p:txBody>
+            <a:bodyPr rtlCol="0" anchor="ctr"/>
+            <a:lstStyle/>
+            <a:p>
+              <a:pPr algn="ctr"/>
+              <a:endParaRPr lang="en-GB" sz="2400"/>
+            </a:p>
+          </p:txBody>
+        </p:sp>
+        <p:sp>
+          <p:nvSpPr>
+            <p:cNvPr id="15" name="Стрелка вправо 14"/>
+            <p:cNvSpPr/>
+            <p:nvPr/>
+          </p:nvSpPr>
+          <p:spPr>
+            <a:xfrm>
+              <a:off x="5328458" y="4471674"/>
+              <a:ext cx="1539932" cy="448887"/>
+            </a:xfrm>
+            <a:prstGeom prst="rightArrow">
+              <a:avLst/>
+            </a:prstGeom>
+          </p:spPr>
+          <p:style>
+            <a:lnRef idx="2">
+              <a:schemeClr val="accent5">
+                <a:shade val="50000"/>
+              </a:schemeClr>
+            </a:lnRef>
+            <a:fillRef idx="1">
+              <a:schemeClr val="accent5"/>
+            </a:fillRef>
+            <a:effectRef idx="0">
+              <a:schemeClr val="accent5"/>
+            </a:effectRef>
+            <a:fontRef idx="minor">
+              <a:schemeClr val="lt1"/>
+            </a:fontRef>
+          </p:style>
+          <p:txBody>
+            <a:bodyPr rtlCol="0" anchor="ctr"/>
+            <a:lstStyle/>
+            <a:p>
+              <a:pPr algn="ctr"/>
+              <a:endParaRPr lang="en-GB" sz="2400"/>
+            </a:p>
+          </p:txBody>
+        </p:sp>
+      </p:grpSp>
+    </p:spTree>
+    <p:extLst>
+      <p:ext uri="{BB962C8B-B14F-4D97-AF65-F5344CB8AC3E}">
+        <p14:creationId xmlns:p14="http://schemas.microsoft.com/office/powerpoint/2010/main" val="853913088"/>
+      </p:ext>
+    </p:extLst>
+  </p:cSld>
+  <p:clrMapOvr>
+    <a:masterClrMapping/>
+  </p:clrMapOvr>
+  <p:timing>
+    <p:tnLst>
+      <p:par>
+        <p:cTn id="1" dur="indefinite" restart="never" nodeType="tmRoot"/>
+      </p:par>
+    </p:tnLst>
+  </p:timing>
+</p:sld>
+</file>
+
+<file path=ppt/slides/slide21.xml><?xml version="1.0" encoding="utf-8"?>
+<p:sld xmlns:a="http://schemas.openxmlformats.org/drawingml/2006/main" xmlns:r="http://schemas.openxmlformats.org/officeDocument/2006/relationships" xmlns:p="http://schemas.openxmlformats.org/presentationml/2006/main">
+  <p:cSld>
+    <p:spTree>
+      <p:nvGrpSpPr>
+        <p:cNvPr id="1" name=""/>
+        <p:cNvGrpSpPr/>
+        <p:nvPr/>
+      </p:nvGrpSpPr>
+      <p:grpSpPr>
+        <a:xfrm>
+          <a:off x="0" y="0"/>
+          <a:ext cx="0" cy="0"/>
+          <a:chOff x="0" y="0"/>
+          <a:chExt cx="0" cy="0"/>
+        </a:xfrm>
+      </p:grpSpPr>
+      <p:sp>
+        <p:nvSpPr>
+          <p:cNvPr id="2" name="Заголовок 1"/>
+          <p:cNvSpPr>
+            <a:spLocks noGrp="1"/>
+          </p:cNvSpPr>
+          <p:nvPr>
+            <p:ph type="title"/>
+          </p:nvPr>
+        </p:nvSpPr>
+        <p:spPr/>
+        <p:txBody>
+          <a:bodyPr/>
+          <a:lstStyle/>
+          <a:p>
+            <a:r>
+              <a:rPr lang="ru-RU" dirty="0"/>
+              <a:t>Отношение </a:t>
+            </a:r>
+            <a:r>
+              <a:rPr lang="en-US" dirty="0"/>
+              <a:t>one-to-many</a:t>
+            </a:r>
+            <a:r>
+              <a:rPr lang="ru-RU" dirty="0" smtClean="0"/>
+              <a:t>(2)</a:t>
+            </a:r>
+            <a:endParaRPr lang="en-GB" dirty="0"/>
+          </a:p>
+        </p:txBody>
+      </p:sp>
+      <p:sp>
+        <p:nvSpPr>
+          <p:cNvPr id="4" name="Дата 3"/>
+          <p:cNvSpPr>
+            <a:spLocks noGrp="1"/>
+          </p:cNvSpPr>
+          <p:nvPr>
+            <p:ph type="dt" sz="half" idx="10"/>
+          </p:nvPr>
+        </p:nvSpPr>
+        <p:spPr/>
+        <p:txBody>
+          <a:bodyPr/>
+          <a:lstStyle/>
+          <a:p>
+            <a:r>
+              <a:rPr lang="en-US" smtClean="0"/>
+              <a:t>01.03.2016</a:t>
+            </a:r>
+            <a:endParaRPr lang="en-GB"/>
+          </a:p>
+        </p:txBody>
+      </p:sp>
+      <p:sp>
+        <p:nvSpPr>
+          <p:cNvPr id="5" name="Нижний колонтитул 4"/>
+          <p:cNvSpPr>
+            <a:spLocks noGrp="1"/>
+          </p:cNvSpPr>
+          <p:nvPr>
+            <p:ph type="ftr" sz="quarter" idx="11"/>
+          </p:nvPr>
+        </p:nvSpPr>
+        <p:spPr/>
+        <p:txBody>
+          <a:bodyPr/>
+          <a:lstStyle/>
+          <a:p>
+            <a:r>
+              <a:rPr lang="ru-RU" smtClean="0"/>
+              <a:t>Ваганов Михаил Викторович  ASP.NET MVC + Oracle Database</a:t>
+            </a:r>
+            <a:endParaRPr lang="en-GB"/>
+          </a:p>
+        </p:txBody>
+      </p:sp>
+      <p:sp>
+        <p:nvSpPr>
+          <p:cNvPr id="6" name="Номер слайда 5"/>
+          <p:cNvSpPr>
+            <a:spLocks noGrp="1"/>
+          </p:cNvSpPr>
+          <p:nvPr>
+            <p:ph type="sldNum" sz="quarter" idx="12"/>
+          </p:nvPr>
+        </p:nvSpPr>
+        <p:spPr/>
+        <p:txBody>
+          <a:bodyPr/>
+          <a:lstStyle/>
+          <a:p>
+            <a:fld id="{8FD3F87F-7A79-4F3D-8F12-CD11A20D067D}" type="slidenum">
+              <a:rPr lang="en-GB" smtClean="0"/>
+              <a:t>21</a:t>
+            </a:fld>
+            <a:endParaRPr lang="en-GB"/>
+          </a:p>
+        </p:txBody>
+      </p:sp>
+      <p:grpSp>
+        <p:nvGrpSpPr>
+          <p:cNvPr id="14" name="Группа 13"/>
+          <p:cNvGrpSpPr/>
+          <p:nvPr/>
+        </p:nvGrpSpPr>
+        <p:grpSpPr>
+          <a:xfrm>
+            <a:off x="1961804" y="2676698"/>
+            <a:ext cx="2294312" cy="1996903"/>
+            <a:chOff x="1961804" y="2676698"/>
+            <a:chExt cx="2294312" cy="1996903"/>
+          </a:xfrm>
+        </p:grpSpPr>
+        <p:sp>
+          <p:nvSpPr>
+            <p:cNvPr id="8" name="Прямоугольник 7"/>
+            <p:cNvSpPr/>
+            <p:nvPr/>
+          </p:nvSpPr>
+          <p:spPr>
+            <a:xfrm>
+              <a:off x="1961804" y="2676698"/>
+              <a:ext cx="2294312" cy="1996903"/>
+            </a:xfrm>
+            <a:prstGeom prst="rect">
+              <a:avLst/>
+            </a:prstGeom>
+          </p:spPr>
+          <p:style>
+            <a:lnRef idx="2">
+              <a:schemeClr val="dk1"/>
+            </a:lnRef>
+            <a:fillRef idx="1">
+              <a:schemeClr val="lt1"/>
+            </a:fillRef>
+            <a:effectRef idx="0">
+              <a:schemeClr val="dk1"/>
+            </a:effectRef>
+            <a:fontRef idx="minor">
+              <a:schemeClr val="dk1"/>
+            </a:fontRef>
+          </p:style>
+          <p:txBody>
+            <a:bodyPr rtlCol="0" anchor="t"/>
+            <a:lstStyle/>
+            <a:p>
+              <a:pPr algn="ctr"/>
+              <a:r>
+                <a:rPr lang="ru-RU" dirty="0"/>
+                <a:t>Адрес</a:t>
+              </a:r>
+              <a:endParaRPr lang="en-GB" dirty="0"/>
+            </a:p>
+          </p:txBody>
+        </p:sp>
+        <p:sp>
+          <p:nvSpPr>
+            <p:cNvPr id="13" name="Прямоугольник 12"/>
+            <p:cNvSpPr/>
+            <p:nvPr/>
+          </p:nvSpPr>
+          <p:spPr>
+            <a:xfrm>
+              <a:off x="1961804" y="3163297"/>
+              <a:ext cx="2294312" cy="1510304"/>
+            </a:xfrm>
+            <a:prstGeom prst="rect">
+              <a:avLst/>
+            </a:prstGeom>
+          </p:spPr>
+          <p:style>
+            <a:lnRef idx="2">
+              <a:schemeClr val="dk1"/>
+            </a:lnRef>
+            <a:fillRef idx="1">
+              <a:schemeClr val="lt1"/>
+            </a:fillRef>
+            <a:effectRef idx="0">
+              <a:schemeClr val="dk1"/>
+            </a:effectRef>
+            <a:fontRef idx="minor">
+              <a:schemeClr val="dk1"/>
+            </a:fontRef>
+          </p:style>
+          <p:txBody>
+            <a:bodyPr rtlCol="0" anchor="ctr"/>
+            <a:lstStyle/>
+            <a:p>
+              <a:pPr algn="ctr"/>
+              <a:endParaRPr lang="en-GB"/>
+            </a:p>
+          </p:txBody>
+        </p:sp>
+      </p:grpSp>
+      <p:grpSp>
+        <p:nvGrpSpPr>
+          <p:cNvPr id="15" name="Группа 14"/>
+          <p:cNvGrpSpPr/>
+          <p:nvPr/>
+        </p:nvGrpSpPr>
+        <p:grpSpPr>
+          <a:xfrm>
+            <a:off x="6096000" y="2676698"/>
+            <a:ext cx="2294312" cy="1996903"/>
+            <a:chOff x="1961804" y="2676698"/>
+            <a:chExt cx="2294312" cy="1996903"/>
+          </a:xfrm>
+        </p:grpSpPr>
+        <p:sp>
+          <p:nvSpPr>
+            <p:cNvPr id="16" name="Прямоугольник 15"/>
+            <p:cNvSpPr/>
+            <p:nvPr/>
+          </p:nvSpPr>
+          <p:spPr>
+            <a:xfrm>
+              <a:off x="1961804" y="2676698"/>
+              <a:ext cx="2294312" cy="1996903"/>
+            </a:xfrm>
+            <a:prstGeom prst="rect">
+              <a:avLst/>
+            </a:prstGeom>
+          </p:spPr>
+          <p:style>
+            <a:lnRef idx="2">
+              <a:schemeClr val="dk1"/>
+            </a:lnRef>
+            <a:fillRef idx="1">
+              <a:schemeClr val="lt1"/>
+            </a:fillRef>
+            <a:effectRef idx="0">
+              <a:schemeClr val="dk1"/>
+            </a:effectRef>
+            <a:fontRef idx="minor">
+              <a:schemeClr val="dk1"/>
+            </a:fontRef>
+          </p:style>
+          <p:txBody>
+            <a:bodyPr rtlCol="0" anchor="t"/>
+            <a:lstStyle/>
+            <a:p>
+              <a:pPr algn="ctr"/>
+              <a:r>
+                <a:rPr lang="ru-RU" dirty="0" smtClean="0"/>
+                <a:t>Пользователь</a:t>
+              </a:r>
+              <a:endParaRPr lang="en-GB" dirty="0"/>
+            </a:p>
+          </p:txBody>
+        </p:sp>
+        <p:sp>
+          <p:nvSpPr>
+            <p:cNvPr id="17" name="Прямоугольник 16"/>
+            <p:cNvSpPr/>
+            <p:nvPr/>
+          </p:nvSpPr>
+          <p:spPr>
+            <a:xfrm>
+              <a:off x="1961804" y="3163297"/>
+              <a:ext cx="2294312" cy="1510304"/>
+            </a:xfrm>
+            <a:prstGeom prst="rect">
+              <a:avLst/>
+            </a:prstGeom>
+          </p:spPr>
+          <p:style>
+            <a:lnRef idx="2">
+              <a:schemeClr val="dk1"/>
+            </a:lnRef>
+            <a:fillRef idx="1">
+              <a:schemeClr val="lt1"/>
+            </a:fillRef>
+            <a:effectRef idx="0">
+              <a:schemeClr val="dk1"/>
+            </a:effectRef>
+            <a:fontRef idx="minor">
+              <a:schemeClr val="dk1"/>
+            </a:fontRef>
+          </p:style>
+          <p:txBody>
+            <a:bodyPr rtlCol="0" anchor="ctr"/>
+            <a:lstStyle/>
+            <a:p>
+              <a:pPr algn="ctr"/>
+              <a:endParaRPr lang="en-GB"/>
+            </a:p>
+          </p:txBody>
+        </p:sp>
+      </p:grpSp>
+      <p:cxnSp>
+        <p:nvCxnSpPr>
+          <p:cNvPr id="19" name="Прямая со стрелкой 18"/>
+          <p:cNvCxnSpPr>
+            <a:stCxn id="8" idx="3"/>
+          </p:cNvCxnSpPr>
+          <p:nvPr/>
+        </p:nvCxnSpPr>
+        <p:spPr>
+          <a:xfrm flipV="1">
+            <a:off x="4256116" y="3675148"/>
+            <a:ext cx="1839884" cy="2"/>
+          </a:xfrm>
+          <a:prstGeom prst="straightConnector1">
+            <a:avLst/>
+          </a:prstGeom>
+          <a:ln>
+            <a:tailEnd type="triangle"/>
+          </a:ln>
+        </p:spPr>
+        <p:style>
+          <a:lnRef idx="1">
+            <a:schemeClr val="dk1"/>
+          </a:lnRef>
+          <a:fillRef idx="0">
+            <a:schemeClr val="dk1"/>
+          </a:fillRef>
+          <a:effectRef idx="0">
+            <a:schemeClr val="dk1"/>
+          </a:effectRef>
+          <a:fontRef idx="minor">
+            <a:schemeClr val="tx1"/>
+          </a:fontRef>
+        </p:style>
+      </p:cxnSp>
+      <p:sp>
+        <p:nvSpPr>
+          <p:cNvPr id="20" name="TextBox 19"/>
+          <p:cNvSpPr txBox="1"/>
+          <p:nvPr/>
+        </p:nvSpPr>
+        <p:spPr>
+          <a:xfrm>
+            <a:off x="4256116" y="3305816"/>
+            <a:ext cx="301686" cy="369332"/>
+          </a:xfrm>
+          <a:prstGeom prst="rect">
+            <a:avLst/>
+          </a:prstGeom>
+          <a:noFill/>
+        </p:spPr>
+        <p:txBody>
+          <a:bodyPr wrap="none" rtlCol="0">
+            <a:spAutoFit/>
+          </a:bodyPr>
+          <a:lstStyle/>
+          <a:p>
+            <a:r>
+              <a:rPr lang="ru-RU" dirty="0" smtClean="0"/>
+              <a:t>1</a:t>
+            </a:r>
+            <a:endParaRPr lang="en-GB" dirty="0"/>
+          </a:p>
+        </p:txBody>
+      </p:sp>
+      <p:sp>
+        <p:nvSpPr>
+          <p:cNvPr id="21" name="TextBox 20"/>
+          <p:cNvSpPr txBox="1"/>
+          <p:nvPr/>
+        </p:nvSpPr>
+        <p:spPr>
+          <a:xfrm>
+            <a:off x="5707752" y="3305816"/>
+            <a:ext cx="388248" cy="369332"/>
+          </a:xfrm>
+          <a:prstGeom prst="rect">
+            <a:avLst/>
+          </a:prstGeom>
+          <a:noFill/>
+        </p:spPr>
+        <p:txBody>
+          <a:bodyPr wrap="none" rtlCol="0">
+            <a:spAutoFit/>
+          </a:bodyPr>
+          <a:lstStyle/>
+          <a:p>
+            <a:r>
+              <a:rPr lang="en-GB" dirty="0" smtClean="0"/>
+              <a:t>ꝏ</a:t>
+            </a:r>
+            <a:endParaRPr lang="en-GB" dirty="0"/>
+          </a:p>
+        </p:txBody>
+      </p:sp>
+    </p:spTree>
+    <p:extLst>
+      <p:ext uri="{BB962C8B-B14F-4D97-AF65-F5344CB8AC3E}">
+        <p14:creationId xmlns:p14="http://schemas.microsoft.com/office/powerpoint/2010/main" val="3712183866"/>
+      </p:ext>
+    </p:extLst>
+  </p:cSld>
+  <p:clrMapOvr>
+    <a:masterClrMapping/>
+  </p:clrMapOvr>
+  <p:timing>
+    <p:tnLst>
+      <p:par>
+        <p:cTn id="1" dur="indefinite" restart="never" nodeType="tmRoot"/>
+      </p:par>
+    </p:tnLst>
+  </p:timing>
+</p:sld>
+</file>
+
+<file path=ppt/slides/slide22.xml><?xml version="1.0" encoding="utf-8"?>
+<p:sld xmlns:a="http://schemas.openxmlformats.org/drawingml/2006/main" xmlns:r="http://schemas.openxmlformats.org/officeDocument/2006/relationships" xmlns:p="http://schemas.openxmlformats.org/presentationml/2006/main">
+  <p:cSld>
+    <p:spTree>
+      <p:nvGrpSpPr>
+        <p:cNvPr id="1" name=""/>
+        <p:cNvGrpSpPr/>
+        <p:nvPr/>
+      </p:nvGrpSpPr>
+      <p:grpSpPr>
+        <a:xfrm>
+          <a:off x="0" y="0"/>
+          <a:ext cx="0" cy="0"/>
+          <a:chOff x="0" y="0"/>
+          <a:chExt cx="0" cy="0"/>
+        </a:xfrm>
+      </p:grpSpPr>
+      <p:sp>
+        <p:nvSpPr>
+          <p:cNvPr id="2" name="Заголовок 1"/>
+          <p:cNvSpPr>
+            <a:spLocks noGrp="1"/>
+          </p:cNvSpPr>
+          <p:nvPr>
+            <p:ph type="title"/>
+          </p:nvPr>
+        </p:nvSpPr>
+        <p:spPr/>
+        <p:txBody>
+          <a:bodyPr/>
+          <a:lstStyle/>
+          <a:p>
+            <a:r>
+              <a:rPr lang="ru-RU" dirty="0" smtClean="0"/>
+              <a:t>Отношение </a:t>
+            </a:r>
+            <a:r>
+              <a:rPr lang="en-US" dirty="0" smtClean="0"/>
+              <a:t>Many-to-many</a:t>
+            </a:r>
+            <a:endParaRPr lang="en-GB" dirty="0"/>
+          </a:p>
+        </p:txBody>
+      </p:sp>
+      <p:sp>
+        <p:nvSpPr>
+          <p:cNvPr id="4" name="Дата 3"/>
+          <p:cNvSpPr>
+            <a:spLocks noGrp="1"/>
+          </p:cNvSpPr>
+          <p:nvPr>
+            <p:ph type="dt" sz="half" idx="10"/>
+          </p:nvPr>
+        </p:nvSpPr>
+        <p:spPr/>
+        <p:txBody>
+          <a:bodyPr/>
+          <a:lstStyle/>
+          <a:p>
+            <a:r>
+              <a:rPr lang="en-US" smtClean="0"/>
+              <a:t>01.03.2016</a:t>
+            </a:r>
+            <a:endParaRPr lang="en-GB"/>
+          </a:p>
+        </p:txBody>
+      </p:sp>
+      <p:sp>
+        <p:nvSpPr>
+          <p:cNvPr id="5" name="Нижний колонтитул 4"/>
+          <p:cNvSpPr>
+            <a:spLocks noGrp="1"/>
+          </p:cNvSpPr>
+          <p:nvPr>
+            <p:ph type="ftr" sz="quarter" idx="11"/>
+          </p:nvPr>
+        </p:nvSpPr>
+        <p:spPr/>
+        <p:txBody>
+          <a:bodyPr/>
+          <a:lstStyle/>
+          <a:p>
+            <a:r>
+              <a:rPr lang="ru-RU" smtClean="0"/>
+              <a:t>Ваганов Михаил Викторович  ASP.NET MVC + Oracle Database</a:t>
+            </a:r>
+            <a:endParaRPr lang="en-GB"/>
+          </a:p>
+        </p:txBody>
+      </p:sp>
+      <p:sp>
+        <p:nvSpPr>
+          <p:cNvPr id="6" name="Номер слайда 5"/>
+          <p:cNvSpPr>
+            <a:spLocks noGrp="1"/>
+          </p:cNvSpPr>
+          <p:nvPr>
+            <p:ph type="sldNum" sz="quarter" idx="12"/>
+          </p:nvPr>
+        </p:nvSpPr>
+        <p:spPr/>
+        <p:txBody>
+          <a:bodyPr/>
+          <a:lstStyle/>
+          <a:p>
+            <a:fld id="{8FD3F87F-7A79-4F3D-8F12-CD11A20D067D}" type="slidenum">
+              <a:rPr lang="en-GB" smtClean="0"/>
+              <a:t>22</a:t>
+            </a:fld>
+            <a:endParaRPr lang="en-GB"/>
+          </a:p>
+        </p:txBody>
+      </p:sp>
+      <p:sp>
+        <p:nvSpPr>
+          <p:cNvPr id="8" name="Прямоугольник 7"/>
+          <p:cNvSpPr/>
+          <p:nvPr/>
+        </p:nvSpPr>
+        <p:spPr>
+          <a:xfrm>
+            <a:off x="5046518" y="2222480"/>
+            <a:ext cx="2370513" cy="842442"/>
+          </a:xfrm>
+          <a:prstGeom prst="rect">
+            <a:avLst/>
+          </a:prstGeom>
+        </p:spPr>
+        <p:style>
+          <a:lnRef idx="3">
+            <a:schemeClr val="lt1"/>
+          </a:lnRef>
+          <a:fillRef idx="1">
+            <a:schemeClr val="accent1"/>
+          </a:fillRef>
+          <a:effectRef idx="1">
+            <a:schemeClr val="accent1"/>
+          </a:effectRef>
+          <a:fontRef idx="minor">
+            <a:schemeClr val="lt1"/>
+          </a:fontRef>
+        </p:style>
+        <p:txBody>
+          <a:bodyPr rtlCol="0" anchor="ctr"/>
+          <a:lstStyle/>
+          <a:p>
+            <a:pPr algn="ctr"/>
+            <a:r>
+              <a:rPr lang="ru-RU" sz="2400" dirty="0" smtClean="0"/>
+              <a:t>Пользователь 1</a:t>
+            </a:r>
+            <a:endParaRPr lang="en-GB" sz="2400" dirty="0"/>
+          </a:p>
+        </p:txBody>
+      </p:sp>
+      <p:sp>
+        <p:nvSpPr>
+          <p:cNvPr id="9" name="Прямоугольник 8"/>
+          <p:cNvSpPr/>
+          <p:nvPr/>
+        </p:nvSpPr>
+        <p:spPr>
+          <a:xfrm>
+            <a:off x="9156468" y="2222480"/>
+            <a:ext cx="2370513" cy="842441"/>
+          </a:xfrm>
+          <a:prstGeom prst="rect">
+            <a:avLst/>
+          </a:prstGeom>
+        </p:spPr>
+        <p:style>
+          <a:lnRef idx="3">
+            <a:schemeClr val="lt1"/>
+          </a:lnRef>
+          <a:fillRef idx="1">
+            <a:schemeClr val="accent6"/>
+          </a:fillRef>
+          <a:effectRef idx="1">
+            <a:schemeClr val="accent6"/>
+          </a:effectRef>
+          <a:fontRef idx="minor">
+            <a:schemeClr val="lt1"/>
+          </a:fontRef>
+        </p:style>
+        <p:txBody>
+          <a:bodyPr rtlCol="0" anchor="ctr"/>
+          <a:lstStyle/>
+          <a:p>
+            <a:pPr algn="ctr"/>
+            <a:r>
+              <a:rPr lang="ru-RU" sz="2400" dirty="0" smtClean="0"/>
+              <a:t>Факультет 1</a:t>
+            </a:r>
+            <a:endParaRPr lang="en-GB" sz="2400" dirty="0"/>
+          </a:p>
+        </p:txBody>
+      </p:sp>
+      <p:sp>
+        <p:nvSpPr>
+          <p:cNvPr id="10" name="Прямоугольник 9"/>
+          <p:cNvSpPr/>
+          <p:nvPr/>
+        </p:nvSpPr>
+        <p:spPr>
+          <a:xfrm>
+            <a:off x="5046518" y="3299676"/>
+            <a:ext cx="2370513" cy="842442"/>
+          </a:xfrm>
+          <a:prstGeom prst="rect">
+            <a:avLst/>
+          </a:prstGeom>
+        </p:spPr>
+        <p:style>
+          <a:lnRef idx="3">
+            <a:schemeClr val="lt1"/>
+          </a:lnRef>
+          <a:fillRef idx="1">
+            <a:schemeClr val="accent1"/>
+          </a:fillRef>
+          <a:effectRef idx="1">
+            <a:schemeClr val="accent1"/>
+          </a:effectRef>
+          <a:fontRef idx="minor">
+            <a:schemeClr val="lt1"/>
+          </a:fontRef>
+        </p:style>
+        <p:txBody>
+          <a:bodyPr rtlCol="0" anchor="ctr"/>
+          <a:lstStyle/>
+          <a:p>
+            <a:pPr algn="ctr"/>
+            <a:r>
+              <a:rPr lang="ru-RU" sz="2400" dirty="0" smtClean="0"/>
+              <a:t>Пользователь 2</a:t>
+            </a:r>
+            <a:endParaRPr lang="en-GB" sz="2400" dirty="0"/>
+          </a:p>
+        </p:txBody>
+      </p:sp>
+      <p:sp>
+        <p:nvSpPr>
+          <p:cNvPr id="11" name="Прямоугольник 10"/>
+          <p:cNvSpPr/>
+          <p:nvPr/>
+        </p:nvSpPr>
+        <p:spPr>
+          <a:xfrm>
+            <a:off x="9156468" y="3299676"/>
+            <a:ext cx="2370513" cy="1722858"/>
+          </a:xfrm>
+          <a:prstGeom prst="rect">
+            <a:avLst/>
+          </a:prstGeom>
+        </p:spPr>
+        <p:style>
+          <a:lnRef idx="3">
+            <a:schemeClr val="lt1"/>
+          </a:lnRef>
+          <a:fillRef idx="1">
+            <a:schemeClr val="accent6"/>
+          </a:fillRef>
+          <a:effectRef idx="1">
+            <a:schemeClr val="accent6"/>
+          </a:effectRef>
+          <a:fontRef idx="minor">
+            <a:schemeClr val="lt1"/>
+          </a:fontRef>
+        </p:style>
+        <p:txBody>
+          <a:bodyPr rtlCol="0" anchor="ctr"/>
+          <a:lstStyle/>
+          <a:p>
+            <a:pPr algn="ctr"/>
+            <a:r>
+              <a:rPr lang="ru-RU" sz="2400" dirty="0" smtClean="0"/>
+              <a:t>Факультет 3</a:t>
+            </a:r>
+            <a:endParaRPr lang="en-GB" sz="2400" dirty="0"/>
+          </a:p>
+        </p:txBody>
+      </p:sp>
+      <p:sp>
+        <p:nvSpPr>
+          <p:cNvPr id="12" name="Прямоугольник 11"/>
+          <p:cNvSpPr/>
+          <p:nvPr/>
+        </p:nvSpPr>
+        <p:spPr>
+          <a:xfrm>
+            <a:off x="5046518" y="4376871"/>
+            <a:ext cx="2370513" cy="842442"/>
+          </a:xfrm>
+          <a:prstGeom prst="rect">
+            <a:avLst/>
+          </a:prstGeom>
+        </p:spPr>
+        <p:style>
+          <a:lnRef idx="3">
+            <a:schemeClr val="lt1"/>
+          </a:lnRef>
+          <a:fillRef idx="1">
+            <a:schemeClr val="accent1"/>
+          </a:fillRef>
+          <a:effectRef idx="1">
+            <a:schemeClr val="accent1"/>
+          </a:effectRef>
+          <a:fontRef idx="minor">
+            <a:schemeClr val="lt1"/>
+          </a:fontRef>
+        </p:style>
+        <p:txBody>
+          <a:bodyPr rtlCol="0" anchor="ctr"/>
+          <a:lstStyle/>
+          <a:p>
+            <a:pPr algn="ctr"/>
+            <a:r>
+              <a:rPr lang="ru-RU" sz="2400" dirty="0" smtClean="0"/>
+              <a:t>Пользователь 3</a:t>
+            </a:r>
+            <a:endParaRPr lang="en-GB" sz="2400" dirty="0"/>
+          </a:p>
+        </p:txBody>
+      </p:sp>
+      <p:sp>
+        <p:nvSpPr>
+          <p:cNvPr id="14" name="Стрелка вправо 13"/>
+          <p:cNvSpPr/>
+          <p:nvPr/>
+        </p:nvSpPr>
+        <p:spPr>
+          <a:xfrm>
+            <a:off x="7516783" y="2419749"/>
+            <a:ext cx="1539932" cy="448887"/>
+          </a:xfrm>
+          <a:prstGeom prst="rightArrow">
+            <a:avLst/>
+          </a:prstGeom>
+        </p:spPr>
+        <p:style>
+          <a:lnRef idx="2">
+            <a:schemeClr val="accent5">
+              <a:shade val="50000"/>
+            </a:schemeClr>
+          </a:lnRef>
+          <a:fillRef idx="1">
+            <a:schemeClr val="accent5"/>
+          </a:fillRef>
+          <a:effectRef idx="0">
+            <a:schemeClr val="accent5"/>
+          </a:effectRef>
+          <a:fontRef idx="minor">
+            <a:schemeClr val="lt1"/>
+          </a:fontRef>
+        </p:style>
+        <p:txBody>
+          <a:bodyPr rtlCol="0" anchor="ctr"/>
+          <a:lstStyle/>
+          <a:p>
+            <a:pPr algn="ctr"/>
+            <a:endParaRPr lang="en-GB" sz="2400"/>
+          </a:p>
+        </p:txBody>
+      </p:sp>
+      <p:sp>
+        <p:nvSpPr>
+          <p:cNvPr id="15" name="Стрелка вправо 14"/>
+          <p:cNvSpPr/>
+          <p:nvPr/>
+        </p:nvSpPr>
+        <p:spPr>
+          <a:xfrm>
+            <a:off x="7516783" y="3496698"/>
+            <a:ext cx="1539932" cy="448887"/>
+          </a:xfrm>
+          <a:prstGeom prst="rightArrow">
+            <a:avLst/>
+          </a:prstGeom>
+        </p:spPr>
+        <p:style>
+          <a:lnRef idx="2">
+            <a:schemeClr val="accent5">
+              <a:shade val="50000"/>
+            </a:schemeClr>
+          </a:lnRef>
+          <a:fillRef idx="1">
+            <a:schemeClr val="accent5"/>
+          </a:fillRef>
+          <a:effectRef idx="0">
+            <a:schemeClr val="accent5"/>
+          </a:effectRef>
+          <a:fontRef idx="minor">
+            <a:schemeClr val="lt1"/>
+          </a:fontRef>
+        </p:style>
+        <p:txBody>
+          <a:bodyPr rtlCol="0" anchor="ctr"/>
+          <a:lstStyle/>
+          <a:p>
+            <a:pPr algn="ctr"/>
+            <a:endParaRPr lang="en-GB" sz="2400"/>
+          </a:p>
+        </p:txBody>
+      </p:sp>
+      <p:sp>
+        <p:nvSpPr>
+          <p:cNvPr id="16" name="Стрелка вправо 15"/>
+          <p:cNvSpPr/>
+          <p:nvPr/>
+        </p:nvSpPr>
+        <p:spPr>
+          <a:xfrm>
+            <a:off x="7516783" y="4573647"/>
+            <a:ext cx="1539932" cy="448887"/>
+          </a:xfrm>
+          <a:prstGeom prst="rightArrow">
+            <a:avLst/>
+          </a:prstGeom>
+        </p:spPr>
+        <p:style>
+          <a:lnRef idx="2">
+            <a:schemeClr val="accent5">
+              <a:shade val="50000"/>
+            </a:schemeClr>
+          </a:lnRef>
+          <a:fillRef idx="1">
+            <a:schemeClr val="accent5"/>
+          </a:fillRef>
+          <a:effectRef idx="0">
+            <a:schemeClr val="accent5"/>
+          </a:effectRef>
+          <a:fontRef idx="minor">
+            <a:schemeClr val="lt1"/>
+          </a:fontRef>
+        </p:style>
+        <p:txBody>
+          <a:bodyPr rtlCol="0" anchor="ctr"/>
+          <a:lstStyle/>
+          <a:p>
+            <a:pPr algn="ctr"/>
+            <a:endParaRPr lang="en-GB" sz="2400"/>
+          </a:p>
+        </p:txBody>
+      </p:sp>
+      <p:sp>
+        <p:nvSpPr>
+          <p:cNvPr id="27" name="Прямоугольник 26"/>
+          <p:cNvSpPr/>
+          <p:nvPr/>
+        </p:nvSpPr>
+        <p:spPr>
+          <a:xfrm>
+            <a:off x="971550" y="4376872"/>
+            <a:ext cx="2370513" cy="842441"/>
+          </a:xfrm>
+          <a:prstGeom prst="rect">
+            <a:avLst/>
+          </a:prstGeom>
+        </p:spPr>
+        <p:style>
+          <a:lnRef idx="3">
+            <a:schemeClr val="lt1"/>
+          </a:lnRef>
+          <a:fillRef idx="1">
+            <a:schemeClr val="accent6"/>
+          </a:fillRef>
+          <a:effectRef idx="1">
+            <a:schemeClr val="accent6"/>
+          </a:effectRef>
+          <a:fontRef idx="minor">
+            <a:schemeClr val="lt1"/>
+          </a:fontRef>
+        </p:style>
+        <p:txBody>
+          <a:bodyPr rtlCol="0" anchor="ctr"/>
+          <a:lstStyle/>
+          <a:p>
+            <a:pPr algn="ctr"/>
+            <a:r>
+              <a:rPr lang="ru-RU" sz="2400" dirty="0" smtClean="0"/>
+              <a:t>Факультет 2</a:t>
+            </a:r>
+            <a:endParaRPr lang="en-GB" sz="2400" dirty="0"/>
+          </a:p>
+        </p:txBody>
+      </p:sp>
+      <p:sp>
+        <p:nvSpPr>
+          <p:cNvPr id="28" name="Стрелка вправо 27"/>
+          <p:cNvSpPr/>
+          <p:nvPr/>
+        </p:nvSpPr>
+        <p:spPr>
+          <a:xfrm flipH="1">
+            <a:off x="3441816" y="4573646"/>
+            <a:ext cx="1504949" cy="448887"/>
+          </a:xfrm>
+          <a:prstGeom prst="rightArrow">
+            <a:avLst/>
+          </a:prstGeom>
+        </p:spPr>
+        <p:style>
+          <a:lnRef idx="2">
+            <a:schemeClr val="accent5">
+              <a:shade val="50000"/>
+            </a:schemeClr>
+          </a:lnRef>
+          <a:fillRef idx="1">
+            <a:schemeClr val="accent5"/>
+          </a:fillRef>
+          <a:effectRef idx="0">
+            <a:schemeClr val="accent5"/>
+          </a:effectRef>
+          <a:fontRef idx="minor">
+            <a:schemeClr val="lt1"/>
+          </a:fontRef>
+        </p:style>
+        <p:txBody>
+          <a:bodyPr rtlCol="0" anchor="ctr"/>
+          <a:lstStyle/>
+          <a:p>
+            <a:pPr algn="ctr"/>
+            <a:endParaRPr lang="en-GB" sz="2400"/>
+          </a:p>
+        </p:txBody>
+      </p:sp>
+    </p:spTree>
+    <p:extLst>
+      <p:ext uri="{BB962C8B-B14F-4D97-AF65-F5344CB8AC3E}">
+        <p14:creationId xmlns:p14="http://schemas.microsoft.com/office/powerpoint/2010/main" val="193202063"/>
+      </p:ext>
+    </p:extLst>
+  </p:cSld>
+  <p:clrMapOvr>
+    <a:masterClrMapping/>
+  </p:clrMapOvr>
+  <p:timing>
+    <p:tnLst>
+      <p:par>
+        <p:cTn id="1" dur="indefinite" restart="never" nodeType="tmRoot"/>
+      </p:par>
+    </p:tnLst>
+  </p:timing>
+</p:sld>
+</file>
+
+<file path=ppt/slides/slide23.xml><?xml version="1.0" encoding="utf-8"?>
+<p:sld xmlns:a="http://schemas.openxmlformats.org/drawingml/2006/main" xmlns:r="http://schemas.openxmlformats.org/officeDocument/2006/relationships" xmlns:p="http://schemas.openxmlformats.org/presentationml/2006/main">
+  <p:cSld>
+    <p:spTree>
+      <p:nvGrpSpPr>
+        <p:cNvPr id="1" name=""/>
+        <p:cNvGrpSpPr/>
+        <p:nvPr/>
+      </p:nvGrpSpPr>
+      <p:grpSpPr>
+        <a:xfrm>
+          <a:off x="0" y="0"/>
+          <a:ext cx="0" cy="0"/>
+          <a:chOff x="0" y="0"/>
+          <a:chExt cx="0" cy="0"/>
+        </a:xfrm>
+      </p:grpSpPr>
+      <p:sp>
+        <p:nvSpPr>
+          <p:cNvPr id="2" name="Заголовок 1"/>
+          <p:cNvSpPr>
+            <a:spLocks noGrp="1"/>
+          </p:cNvSpPr>
+          <p:nvPr>
+            <p:ph type="title"/>
+          </p:nvPr>
+        </p:nvSpPr>
+        <p:spPr/>
+        <p:txBody>
+          <a:bodyPr/>
+          <a:lstStyle/>
+          <a:p>
+            <a:r>
+              <a:rPr lang="ru-RU" dirty="0"/>
+              <a:t>Отношение </a:t>
+            </a:r>
+            <a:r>
+              <a:rPr lang="en-US" dirty="0" smtClean="0"/>
+              <a:t>One-to-one</a:t>
+            </a:r>
+            <a:r>
+              <a:rPr lang="ru-RU" dirty="0" smtClean="0"/>
+              <a:t> (2)</a:t>
+            </a:r>
+            <a:endParaRPr lang="en-GB" dirty="0"/>
+          </a:p>
+        </p:txBody>
+      </p:sp>
+      <p:sp>
+        <p:nvSpPr>
+          <p:cNvPr id="4" name="Дата 3"/>
+          <p:cNvSpPr>
+            <a:spLocks noGrp="1"/>
+          </p:cNvSpPr>
+          <p:nvPr>
+            <p:ph type="dt" sz="half" idx="10"/>
+          </p:nvPr>
+        </p:nvSpPr>
+        <p:spPr/>
+        <p:txBody>
+          <a:bodyPr/>
+          <a:lstStyle/>
+          <a:p>
+            <a:r>
+              <a:rPr lang="en-US" smtClean="0"/>
+              <a:t>01.03.2016</a:t>
+            </a:r>
+            <a:endParaRPr lang="en-GB"/>
+          </a:p>
+        </p:txBody>
+      </p:sp>
+      <p:sp>
+        <p:nvSpPr>
+          <p:cNvPr id="5" name="Нижний колонтитул 4"/>
+          <p:cNvSpPr>
+            <a:spLocks noGrp="1"/>
+          </p:cNvSpPr>
+          <p:nvPr>
+            <p:ph type="ftr" sz="quarter" idx="11"/>
+          </p:nvPr>
+        </p:nvSpPr>
+        <p:spPr/>
+        <p:txBody>
+          <a:bodyPr/>
+          <a:lstStyle/>
+          <a:p>
+            <a:r>
+              <a:rPr lang="ru-RU" smtClean="0"/>
+              <a:t>Ваганов Михаил Викторович  ASP.NET MVC + Oracle Database</a:t>
+            </a:r>
+            <a:endParaRPr lang="en-GB"/>
+          </a:p>
+        </p:txBody>
+      </p:sp>
+      <p:sp>
+        <p:nvSpPr>
+          <p:cNvPr id="6" name="Номер слайда 5"/>
+          <p:cNvSpPr>
+            <a:spLocks noGrp="1"/>
+          </p:cNvSpPr>
+          <p:nvPr>
+            <p:ph type="sldNum" sz="quarter" idx="12"/>
+          </p:nvPr>
+        </p:nvSpPr>
+        <p:spPr/>
+        <p:txBody>
+          <a:bodyPr/>
+          <a:lstStyle/>
+          <a:p>
+            <a:fld id="{8FD3F87F-7A79-4F3D-8F12-CD11A20D067D}" type="slidenum">
+              <a:rPr lang="en-GB" smtClean="0"/>
+              <a:t>23</a:t>
+            </a:fld>
+            <a:endParaRPr lang="en-GB"/>
+          </a:p>
+        </p:txBody>
+      </p:sp>
+      <p:grpSp>
+        <p:nvGrpSpPr>
+          <p:cNvPr id="14" name="Группа 13"/>
+          <p:cNvGrpSpPr/>
+          <p:nvPr/>
+        </p:nvGrpSpPr>
+        <p:grpSpPr>
+          <a:xfrm>
+            <a:off x="1961804" y="2676698"/>
+            <a:ext cx="2294312" cy="1996903"/>
+            <a:chOff x="1961804" y="2676698"/>
+            <a:chExt cx="2294312" cy="1996903"/>
+          </a:xfrm>
+        </p:grpSpPr>
+        <p:sp>
+          <p:nvSpPr>
+            <p:cNvPr id="8" name="Прямоугольник 7"/>
+            <p:cNvSpPr/>
+            <p:nvPr/>
+          </p:nvSpPr>
+          <p:spPr>
+            <a:xfrm>
+              <a:off x="1961804" y="2676698"/>
+              <a:ext cx="2294312" cy="1996903"/>
+            </a:xfrm>
+            <a:prstGeom prst="rect">
+              <a:avLst/>
+            </a:prstGeom>
+          </p:spPr>
+          <p:style>
+            <a:lnRef idx="2">
+              <a:schemeClr val="dk1"/>
+            </a:lnRef>
+            <a:fillRef idx="1">
+              <a:schemeClr val="lt1"/>
+            </a:fillRef>
+            <a:effectRef idx="0">
+              <a:schemeClr val="dk1"/>
+            </a:effectRef>
+            <a:fontRef idx="minor">
+              <a:schemeClr val="dk1"/>
+            </a:fontRef>
+          </p:style>
+          <p:txBody>
+            <a:bodyPr rtlCol="0" anchor="t"/>
+            <a:lstStyle/>
+            <a:p>
+              <a:pPr algn="ctr"/>
+              <a:r>
+                <a:rPr lang="ru-RU" dirty="0" smtClean="0"/>
+                <a:t>Пользователь</a:t>
+              </a:r>
+              <a:endParaRPr lang="en-GB" dirty="0"/>
+            </a:p>
+          </p:txBody>
+        </p:sp>
+        <p:sp>
+          <p:nvSpPr>
+            <p:cNvPr id="13" name="Прямоугольник 12"/>
+            <p:cNvSpPr/>
+            <p:nvPr/>
+          </p:nvSpPr>
+          <p:spPr>
+            <a:xfrm>
+              <a:off x="1961804" y="3163297"/>
+              <a:ext cx="2294312" cy="1510304"/>
+            </a:xfrm>
+            <a:prstGeom prst="rect">
+              <a:avLst/>
+            </a:prstGeom>
+          </p:spPr>
+          <p:style>
+            <a:lnRef idx="2">
+              <a:schemeClr val="dk1"/>
+            </a:lnRef>
+            <a:fillRef idx="1">
+              <a:schemeClr val="lt1"/>
+            </a:fillRef>
+            <a:effectRef idx="0">
+              <a:schemeClr val="dk1"/>
+            </a:effectRef>
+            <a:fontRef idx="minor">
+              <a:schemeClr val="dk1"/>
+            </a:fontRef>
+          </p:style>
+          <p:txBody>
+            <a:bodyPr rtlCol="0" anchor="ctr"/>
+            <a:lstStyle/>
+            <a:p>
+              <a:pPr algn="ctr"/>
+              <a:endParaRPr lang="en-GB"/>
+            </a:p>
+          </p:txBody>
+        </p:sp>
+      </p:grpSp>
+      <p:grpSp>
+        <p:nvGrpSpPr>
+          <p:cNvPr id="15" name="Группа 14"/>
+          <p:cNvGrpSpPr/>
+          <p:nvPr/>
+        </p:nvGrpSpPr>
+        <p:grpSpPr>
+          <a:xfrm>
+            <a:off x="6096000" y="2676697"/>
+            <a:ext cx="2294312" cy="1996903"/>
+            <a:chOff x="1961804" y="2676698"/>
+            <a:chExt cx="2294312" cy="1996903"/>
+          </a:xfrm>
+        </p:grpSpPr>
+        <p:sp>
+          <p:nvSpPr>
+            <p:cNvPr id="16" name="Прямоугольник 15"/>
+            <p:cNvSpPr/>
+            <p:nvPr/>
+          </p:nvSpPr>
+          <p:spPr>
+            <a:xfrm>
+              <a:off x="1961804" y="2676698"/>
+              <a:ext cx="2294312" cy="1996903"/>
+            </a:xfrm>
+            <a:prstGeom prst="rect">
+              <a:avLst/>
+            </a:prstGeom>
+          </p:spPr>
+          <p:style>
+            <a:lnRef idx="2">
+              <a:schemeClr val="dk1"/>
+            </a:lnRef>
+            <a:fillRef idx="1">
+              <a:schemeClr val="lt1"/>
+            </a:fillRef>
+            <a:effectRef idx="0">
+              <a:schemeClr val="dk1"/>
+            </a:effectRef>
+            <a:fontRef idx="minor">
+              <a:schemeClr val="dk1"/>
+            </a:fontRef>
+          </p:style>
+          <p:txBody>
+            <a:bodyPr rtlCol="0" anchor="t"/>
+            <a:lstStyle/>
+            <a:p>
+              <a:pPr algn="ctr"/>
+              <a:r>
+                <a:rPr lang="ru-RU" dirty="0" smtClean="0"/>
+                <a:t>Факультет</a:t>
+              </a:r>
+              <a:endParaRPr lang="en-GB" dirty="0"/>
+            </a:p>
+          </p:txBody>
+        </p:sp>
+        <p:sp>
+          <p:nvSpPr>
+            <p:cNvPr id="17" name="Прямоугольник 16"/>
+            <p:cNvSpPr/>
+            <p:nvPr/>
+          </p:nvSpPr>
+          <p:spPr>
+            <a:xfrm>
+              <a:off x="1961804" y="3163297"/>
+              <a:ext cx="2294312" cy="1510304"/>
+            </a:xfrm>
+            <a:prstGeom prst="rect">
+              <a:avLst/>
+            </a:prstGeom>
+          </p:spPr>
+          <p:style>
+            <a:lnRef idx="2">
+              <a:schemeClr val="dk1"/>
+            </a:lnRef>
+            <a:fillRef idx="1">
+              <a:schemeClr val="lt1"/>
+            </a:fillRef>
+            <a:effectRef idx="0">
+              <a:schemeClr val="dk1"/>
+            </a:effectRef>
+            <a:fontRef idx="minor">
+              <a:schemeClr val="dk1"/>
+            </a:fontRef>
+          </p:style>
+          <p:txBody>
+            <a:bodyPr rtlCol="0" anchor="ctr"/>
+            <a:lstStyle/>
+            <a:p>
+              <a:pPr algn="ctr"/>
+              <a:endParaRPr lang="en-GB"/>
+            </a:p>
+          </p:txBody>
+        </p:sp>
+      </p:grpSp>
+      <p:cxnSp>
+        <p:nvCxnSpPr>
+          <p:cNvPr id="19" name="Прямая со стрелкой 18"/>
+          <p:cNvCxnSpPr>
+            <a:stCxn id="8" idx="3"/>
+          </p:cNvCxnSpPr>
+          <p:nvPr/>
+        </p:nvCxnSpPr>
+        <p:spPr>
+          <a:xfrm flipV="1">
+            <a:off x="4256116" y="3675148"/>
+            <a:ext cx="1839884" cy="2"/>
+          </a:xfrm>
+          <a:prstGeom prst="straightConnector1">
+            <a:avLst/>
+          </a:prstGeom>
+          <a:ln>
+            <a:tailEnd type="triangle"/>
+          </a:ln>
+        </p:spPr>
+        <p:style>
+          <a:lnRef idx="1">
+            <a:schemeClr val="dk1"/>
+          </a:lnRef>
+          <a:fillRef idx="0">
+            <a:schemeClr val="dk1"/>
+          </a:fillRef>
+          <a:effectRef idx="0">
+            <a:schemeClr val="dk1"/>
+          </a:effectRef>
+          <a:fontRef idx="minor">
+            <a:schemeClr val="tx1"/>
+          </a:fontRef>
+        </p:style>
+      </p:cxnSp>
+      <p:sp>
+        <p:nvSpPr>
+          <p:cNvPr id="22" name="TextBox 21"/>
+          <p:cNvSpPr txBox="1"/>
+          <p:nvPr/>
+        </p:nvSpPr>
+        <p:spPr>
+          <a:xfrm>
+            <a:off x="5707752" y="3305816"/>
+            <a:ext cx="388248" cy="369332"/>
+          </a:xfrm>
+          <a:prstGeom prst="rect">
+            <a:avLst/>
+          </a:prstGeom>
+          <a:noFill/>
+        </p:spPr>
+        <p:txBody>
+          <a:bodyPr wrap="none" rtlCol="0">
+            <a:spAutoFit/>
+          </a:bodyPr>
+          <a:lstStyle/>
+          <a:p>
+            <a:r>
+              <a:rPr lang="en-GB" dirty="0" smtClean="0"/>
+              <a:t>ꝏ</a:t>
+            </a:r>
+            <a:endParaRPr lang="en-GB" dirty="0"/>
+          </a:p>
+        </p:txBody>
+      </p:sp>
+      <p:sp>
+        <p:nvSpPr>
+          <p:cNvPr id="23" name="TextBox 22"/>
+          <p:cNvSpPr txBox="1"/>
+          <p:nvPr/>
+        </p:nvSpPr>
+        <p:spPr>
+          <a:xfrm>
+            <a:off x="4256116" y="3305816"/>
+            <a:ext cx="388248" cy="369332"/>
+          </a:xfrm>
+          <a:prstGeom prst="rect">
+            <a:avLst/>
+          </a:prstGeom>
+          <a:noFill/>
+        </p:spPr>
+        <p:txBody>
+          <a:bodyPr wrap="none" rtlCol="0">
+            <a:spAutoFit/>
+          </a:bodyPr>
+          <a:lstStyle/>
+          <a:p>
+            <a:r>
+              <a:rPr lang="en-GB" dirty="0" smtClean="0"/>
+              <a:t>ꝏ</a:t>
+            </a:r>
+            <a:endParaRPr lang="en-GB" dirty="0"/>
+          </a:p>
+        </p:txBody>
+      </p:sp>
+    </p:spTree>
+    <p:extLst>
+      <p:ext uri="{BB962C8B-B14F-4D97-AF65-F5344CB8AC3E}">
+        <p14:creationId xmlns:p14="http://schemas.microsoft.com/office/powerpoint/2010/main" val="1144996127"/>
       </p:ext>
     </p:extLst>
   </p:cSld>
@@ -4298,6 +8227,44 @@
       </p:grpSpPr>
       <p:sp>
         <p:nvSpPr>
+          <p:cNvPr id="2" name="Заголовок 1"/>
+          <p:cNvSpPr>
+            <a:spLocks noGrp="1"/>
+          </p:cNvSpPr>
+          <p:nvPr>
+            <p:ph type="title"/>
+          </p:nvPr>
+        </p:nvSpPr>
+        <p:spPr/>
+        <p:txBody>
+          <a:bodyPr/>
+          <a:lstStyle/>
+          <a:p>
+            <a:endParaRPr lang="en-GB"/>
+          </a:p>
+        </p:txBody>
+      </p:sp>
+      <p:sp>
+        <p:nvSpPr>
+          <p:cNvPr id="3" name="Объект 2"/>
+          <p:cNvSpPr>
+            <a:spLocks noGrp="1"/>
+          </p:cNvSpPr>
+          <p:nvPr>
+            <p:ph idx="1"/>
+          </p:nvPr>
+        </p:nvSpPr>
+        <p:spPr/>
+        <p:txBody>
+          <a:bodyPr/>
+          <a:lstStyle/>
+          <a:p>
+            <a:endParaRPr lang="en-GB"/>
+          </a:p>
+        </p:txBody>
+      </p:sp>
+      <p:sp>
+        <p:nvSpPr>
           <p:cNvPr id="4" name="Дата 3"/>
           <p:cNvSpPr>
             <a:spLocks noGrp="1"/>
@@ -4362,527 +8329,6 @@
               <a:t>3</a:t>
             </a:fld>
             <a:endParaRPr lang="en-GB"/>
-          </a:p>
-        </p:txBody>
-      </p:sp>
-      <p:grpSp>
-        <p:nvGrpSpPr>
-          <p:cNvPr id="24" name="Группа 23"/>
-          <p:cNvGrpSpPr/>
-          <p:nvPr/>
-        </p:nvGrpSpPr>
-        <p:grpSpPr>
-          <a:xfrm>
-            <a:off x="1316180" y="1419093"/>
-            <a:ext cx="9559640" cy="4416442"/>
-            <a:chOff x="1113902" y="1419093"/>
-            <a:chExt cx="9559640" cy="4416442"/>
-          </a:xfrm>
-        </p:grpSpPr>
-        <p:sp>
-          <p:nvSpPr>
-            <p:cNvPr id="10" name="Скругленный прямоугольник 9"/>
-            <p:cNvSpPr/>
-            <p:nvPr/>
-          </p:nvSpPr>
-          <p:spPr>
-            <a:xfrm>
-              <a:off x="1113905" y="5054138"/>
-              <a:ext cx="9559637" cy="781397"/>
-            </a:xfrm>
-            <a:prstGeom prst="roundRect">
-              <a:avLst/>
-            </a:prstGeom>
-          </p:spPr>
-          <p:style>
-            <a:lnRef idx="2">
-              <a:schemeClr val="dk1">
-                <a:shade val="50000"/>
-              </a:schemeClr>
-            </a:lnRef>
-            <a:fillRef idx="1">
-              <a:schemeClr val="dk1"/>
-            </a:fillRef>
-            <a:effectRef idx="0">
-              <a:schemeClr val="dk1"/>
-            </a:effectRef>
-            <a:fontRef idx="minor">
-              <a:schemeClr val="lt1"/>
-            </a:fontRef>
-          </p:style>
-          <p:txBody>
-            <a:bodyPr rtlCol="0" anchor="ctr"/>
-            <a:lstStyle/>
-            <a:p>
-              <a:pPr lvl="0" algn="ctr"/>
-              <a:r>
-                <a:rPr lang="en-US" sz="4000"/>
-                <a:t>Common Language Runtime (CLR)</a:t>
-              </a:r>
-              <a:endParaRPr lang="en-GB" sz="4000" dirty="0"/>
-            </a:p>
-          </p:txBody>
-        </p:sp>
-        <p:sp>
-          <p:nvSpPr>
-            <p:cNvPr id="11" name="Скругленный прямоугольник 10"/>
-            <p:cNvSpPr/>
-            <p:nvPr/>
-          </p:nvSpPr>
-          <p:spPr>
-            <a:xfrm>
-              <a:off x="1113905" y="4142624"/>
-              <a:ext cx="9559637" cy="781397"/>
-            </a:xfrm>
-            <a:prstGeom prst="roundRect">
-              <a:avLst/>
-            </a:prstGeom>
-          </p:spPr>
-          <p:style>
-            <a:lnRef idx="3">
-              <a:schemeClr val="lt1"/>
-            </a:lnRef>
-            <a:fillRef idx="1">
-              <a:schemeClr val="accent5"/>
-            </a:fillRef>
-            <a:effectRef idx="1">
-              <a:schemeClr val="accent5"/>
-            </a:effectRef>
-            <a:fontRef idx="minor">
-              <a:schemeClr val="lt1"/>
-            </a:fontRef>
-          </p:style>
-          <p:txBody>
-            <a:bodyPr rtlCol="0" anchor="ctr"/>
-            <a:lstStyle/>
-            <a:p>
-              <a:pPr lvl="0" algn="ctr"/>
-              <a:r>
-                <a:rPr lang="en-US" sz="4000" dirty="0" smtClean="0"/>
-                <a:t>Base Class Library</a:t>
-              </a:r>
-              <a:endParaRPr lang="en-GB" sz="4000" dirty="0"/>
-            </a:p>
-          </p:txBody>
-        </p:sp>
-        <p:sp>
-          <p:nvSpPr>
-            <p:cNvPr id="12" name="Скругленный прямоугольник 11"/>
-            <p:cNvSpPr/>
-            <p:nvPr/>
-          </p:nvSpPr>
-          <p:spPr>
-            <a:xfrm>
-              <a:off x="1113903" y="3242121"/>
-              <a:ext cx="2295144" cy="781397"/>
-            </a:xfrm>
-            <a:prstGeom prst="roundRect">
-              <a:avLst/>
-            </a:prstGeom>
-          </p:spPr>
-          <p:style>
-            <a:lnRef idx="3">
-              <a:schemeClr val="lt1"/>
-            </a:lnRef>
-            <a:fillRef idx="1">
-              <a:schemeClr val="accent6"/>
-            </a:fillRef>
-            <a:effectRef idx="1">
-              <a:schemeClr val="accent6"/>
-            </a:effectRef>
-            <a:fontRef idx="minor">
-              <a:schemeClr val="lt1"/>
-            </a:fontRef>
-          </p:style>
-          <p:txBody>
-            <a:bodyPr rtlCol="0" anchor="ctr"/>
-            <a:lstStyle/>
-            <a:p>
-              <a:pPr lvl="0" algn="ctr"/>
-              <a:r>
-                <a:rPr lang="en-US" sz="2400" dirty="0" smtClean="0"/>
-                <a:t>WCF</a:t>
-              </a:r>
-            </a:p>
-            <a:p>
-              <a:pPr lvl="0" algn="ctr"/>
-              <a:r>
-                <a:rPr lang="en-US" sz="2000" dirty="0" smtClean="0"/>
-                <a:t>(Indigo)</a:t>
-              </a:r>
-              <a:endParaRPr lang="en-GB" sz="2000" dirty="0"/>
-            </a:p>
-          </p:txBody>
-        </p:sp>
-        <p:sp>
-          <p:nvSpPr>
-            <p:cNvPr id="16" name="Скругленный прямоугольник 15"/>
-            <p:cNvSpPr/>
-            <p:nvPr/>
-          </p:nvSpPr>
-          <p:spPr>
-            <a:xfrm>
-              <a:off x="8377012" y="3242121"/>
-              <a:ext cx="2295144" cy="781397"/>
-            </a:xfrm>
-            <a:prstGeom prst="roundRect">
-              <a:avLst/>
-            </a:prstGeom>
-          </p:spPr>
-          <p:style>
-            <a:lnRef idx="3">
-              <a:schemeClr val="lt1"/>
-            </a:lnRef>
-            <a:fillRef idx="1">
-              <a:schemeClr val="accent6"/>
-            </a:fillRef>
-            <a:effectRef idx="1">
-              <a:schemeClr val="accent6"/>
-            </a:effectRef>
-            <a:fontRef idx="minor">
-              <a:schemeClr val="lt1"/>
-            </a:fontRef>
-          </p:style>
-          <p:txBody>
-            <a:bodyPr rtlCol="0" anchor="ctr"/>
-            <a:lstStyle/>
-            <a:p>
-              <a:pPr lvl="0" algn="ctr"/>
-              <a:r>
-                <a:rPr lang="en-US" sz="2400" dirty="0" smtClean="0"/>
-                <a:t>WF</a:t>
-              </a:r>
-            </a:p>
-            <a:p>
-              <a:pPr lvl="0" algn="ctr"/>
-              <a:r>
-                <a:rPr lang="en-US" sz="2000" dirty="0" smtClean="0"/>
-                <a:t>(Workflow)</a:t>
-              </a:r>
-              <a:endParaRPr lang="en-GB" sz="2000" dirty="0"/>
-            </a:p>
-          </p:txBody>
-        </p:sp>
-        <p:sp>
-          <p:nvSpPr>
-            <p:cNvPr id="17" name="Скругленный прямоугольник 16"/>
-            <p:cNvSpPr/>
-            <p:nvPr/>
-          </p:nvSpPr>
-          <p:spPr>
-            <a:xfrm>
-              <a:off x="3534939" y="3237651"/>
-              <a:ext cx="2295144" cy="781397"/>
-            </a:xfrm>
-            <a:prstGeom prst="roundRect">
-              <a:avLst/>
-            </a:prstGeom>
-          </p:spPr>
-          <p:style>
-            <a:lnRef idx="3">
-              <a:schemeClr val="lt1"/>
-            </a:lnRef>
-            <a:fillRef idx="1">
-              <a:schemeClr val="accent6"/>
-            </a:fillRef>
-            <a:effectRef idx="1">
-              <a:schemeClr val="accent6"/>
-            </a:effectRef>
-            <a:fontRef idx="minor">
-              <a:schemeClr val="lt1"/>
-            </a:fontRef>
-          </p:style>
-          <p:txBody>
-            <a:bodyPr rtlCol="0" anchor="ctr"/>
-            <a:lstStyle/>
-            <a:p>
-              <a:pPr lvl="0" algn="ctr"/>
-              <a:r>
-                <a:rPr lang="en-US" sz="2400" dirty="0" smtClean="0"/>
-                <a:t>WPF</a:t>
-              </a:r>
-            </a:p>
-            <a:p>
-              <a:pPr lvl="0" algn="ctr"/>
-              <a:r>
-                <a:rPr lang="en-US" sz="2000" dirty="0" smtClean="0"/>
-                <a:t>(Avalon)</a:t>
-              </a:r>
-              <a:endParaRPr lang="en-GB" sz="2000" dirty="0"/>
-            </a:p>
-          </p:txBody>
-        </p:sp>
-        <p:sp>
-          <p:nvSpPr>
-            <p:cNvPr id="18" name="Скругленный прямоугольник 17"/>
-            <p:cNvSpPr/>
-            <p:nvPr/>
-          </p:nvSpPr>
-          <p:spPr>
-            <a:xfrm>
-              <a:off x="5955975" y="3231110"/>
-              <a:ext cx="2295144" cy="781397"/>
-            </a:xfrm>
-            <a:prstGeom prst="roundRect">
-              <a:avLst/>
-            </a:prstGeom>
-          </p:spPr>
-          <p:style>
-            <a:lnRef idx="3">
-              <a:schemeClr val="lt1"/>
-            </a:lnRef>
-            <a:fillRef idx="1">
-              <a:schemeClr val="accent6"/>
-            </a:fillRef>
-            <a:effectRef idx="1">
-              <a:schemeClr val="accent6"/>
-            </a:effectRef>
-            <a:fontRef idx="minor">
-              <a:schemeClr val="lt1"/>
-            </a:fontRef>
-          </p:style>
-          <p:txBody>
-            <a:bodyPr rtlCol="0" anchor="ctr"/>
-            <a:lstStyle/>
-            <a:p>
-              <a:pPr lvl="0" algn="ctr"/>
-              <a:r>
-                <a:rPr lang="en-US" sz="2400" dirty="0" smtClean="0"/>
-                <a:t>WCS</a:t>
-              </a:r>
-            </a:p>
-            <a:p>
-              <a:pPr lvl="0" algn="ctr"/>
-              <a:r>
-                <a:rPr lang="en-US" sz="2000" dirty="0" smtClean="0"/>
-                <a:t>(</a:t>
-              </a:r>
-              <a:r>
-                <a:rPr lang="en-US" sz="2000" dirty="0" err="1" smtClean="0"/>
-                <a:t>InfoCard</a:t>
-              </a:r>
-              <a:r>
-                <a:rPr lang="en-US" sz="2000" dirty="0" smtClean="0"/>
-                <a:t>)</a:t>
-              </a:r>
-              <a:endParaRPr lang="en-GB" sz="2000" dirty="0"/>
-            </a:p>
-          </p:txBody>
-        </p:sp>
-        <p:sp>
-          <p:nvSpPr>
-            <p:cNvPr id="19" name="Скругленный прямоугольник 18"/>
-            <p:cNvSpPr/>
-            <p:nvPr/>
-          </p:nvSpPr>
-          <p:spPr>
-            <a:xfrm>
-              <a:off x="1113903" y="2330607"/>
-              <a:ext cx="4718304" cy="781397"/>
-            </a:xfrm>
-            <a:prstGeom prst="roundRect">
-              <a:avLst/>
-            </a:prstGeom>
-          </p:spPr>
-          <p:style>
-            <a:lnRef idx="3">
-              <a:schemeClr val="lt1"/>
-            </a:lnRef>
-            <a:fillRef idx="1">
-              <a:schemeClr val="accent2"/>
-            </a:fillRef>
-            <a:effectRef idx="1">
-              <a:schemeClr val="accent2"/>
-            </a:effectRef>
-            <a:fontRef idx="minor">
-              <a:schemeClr val="lt1"/>
-            </a:fontRef>
-          </p:style>
-          <p:txBody>
-            <a:bodyPr rtlCol="0" anchor="ctr"/>
-            <a:lstStyle/>
-            <a:p>
-              <a:pPr lvl="0" algn="ctr"/>
-              <a:r>
-                <a:rPr lang="en-US" sz="2400" dirty="0" smtClean="0"/>
-                <a:t>LINQ</a:t>
-              </a:r>
-              <a:endParaRPr lang="en-GB" sz="2000" dirty="0"/>
-            </a:p>
-          </p:txBody>
-        </p:sp>
-        <p:sp>
-          <p:nvSpPr>
-            <p:cNvPr id="20" name="Скругленный прямоугольник 19"/>
-            <p:cNvSpPr/>
-            <p:nvPr/>
-          </p:nvSpPr>
-          <p:spPr>
-            <a:xfrm>
-              <a:off x="5953852" y="2330607"/>
-              <a:ext cx="4718304" cy="781397"/>
-            </a:xfrm>
-            <a:prstGeom prst="roundRect">
-              <a:avLst/>
-            </a:prstGeom>
-          </p:spPr>
-          <p:style>
-            <a:lnRef idx="3">
-              <a:schemeClr val="lt1"/>
-            </a:lnRef>
-            <a:fillRef idx="1">
-              <a:schemeClr val="accent2"/>
-            </a:fillRef>
-            <a:effectRef idx="1">
-              <a:schemeClr val="accent2"/>
-            </a:effectRef>
-            <a:fontRef idx="minor">
-              <a:schemeClr val="lt1"/>
-            </a:fontRef>
-          </p:style>
-          <p:txBody>
-            <a:bodyPr rtlCol="0" anchor="ctr"/>
-            <a:lstStyle/>
-            <a:p>
-              <a:pPr lvl="0" algn="ctr"/>
-              <a:r>
-                <a:rPr lang="en-US" sz="2400" dirty="0" smtClean="0"/>
-                <a:t>ADO.NET</a:t>
-              </a:r>
-            </a:p>
-            <a:p>
-              <a:pPr lvl="0" algn="ctr"/>
-              <a:r>
-                <a:rPr lang="en-US" sz="2000" dirty="0" smtClean="0"/>
-                <a:t>Entity Framework</a:t>
-              </a:r>
-              <a:endParaRPr lang="en-GB" sz="2000" dirty="0"/>
-            </a:p>
-          </p:txBody>
-        </p:sp>
-        <p:sp>
-          <p:nvSpPr>
-            <p:cNvPr id="21" name="Скругленный прямоугольник 20"/>
-            <p:cNvSpPr/>
-            <p:nvPr/>
-          </p:nvSpPr>
-          <p:spPr>
-            <a:xfrm>
-              <a:off x="1113902" y="1419093"/>
-              <a:ext cx="4718859" cy="781397"/>
-            </a:xfrm>
-            <a:prstGeom prst="roundRect">
-              <a:avLst/>
-            </a:prstGeom>
-          </p:spPr>
-          <p:style>
-            <a:lnRef idx="2">
-              <a:schemeClr val="accent3">
-                <a:shade val="50000"/>
-              </a:schemeClr>
-            </a:lnRef>
-            <a:fillRef idx="1">
-              <a:schemeClr val="accent3"/>
-            </a:fillRef>
-            <a:effectRef idx="0">
-              <a:schemeClr val="accent3"/>
-            </a:effectRef>
-            <a:fontRef idx="minor">
-              <a:schemeClr val="lt1"/>
-            </a:fontRef>
-          </p:style>
-          <p:txBody>
-            <a:bodyPr rtlCol="0" anchor="ctr"/>
-            <a:lstStyle/>
-            <a:p>
-              <a:pPr lvl="0" algn="ctr"/>
-              <a:r>
-                <a:rPr lang="en-US" sz="2400" dirty="0" smtClean="0"/>
-                <a:t>PLINQ</a:t>
-              </a:r>
-              <a:endParaRPr lang="en-GB" sz="2000" dirty="0"/>
-            </a:p>
-          </p:txBody>
-        </p:sp>
-        <p:sp>
-          <p:nvSpPr>
-            <p:cNvPr id="22" name="Скругленный прямоугольник 21"/>
-            <p:cNvSpPr/>
-            <p:nvPr/>
-          </p:nvSpPr>
-          <p:spPr>
-            <a:xfrm>
-              <a:off x="5953852" y="1419093"/>
-              <a:ext cx="4718304" cy="781397"/>
-            </a:xfrm>
-            <a:prstGeom prst="roundRect">
-              <a:avLst/>
-            </a:prstGeom>
-          </p:spPr>
-          <p:style>
-            <a:lnRef idx="2">
-              <a:schemeClr val="accent3">
-                <a:shade val="50000"/>
-              </a:schemeClr>
-            </a:lnRef>
-            <a:fillRef idx="1">
-              <a:schemeClr val="accent3"/>
-            </a:fillRef>
-            <a:effectRef idx="0">
-              <a:schemeClr val="accent3"/>
-            </a:effectRef>
-            <a:fontRef idx="minor">
-              <a:schemeClr val="lt1"/>
-            </a:fontRef>
-          </p:style>
-          <p:txBody>
-            <a:bodyPr rtlCol="0" anchor="ctr"/>
-            <a:lstStyle/>
-            <a:p>
-              <a:pPr lvl="0" algn="ctr"/>
-              <a:r>
-                <a:rPr lang="en-US" sz="2400" dirty="0" smtClean="0"/>
-                <a:t>TPL</a:t>
-              </a:r>
-            </a:p>
-          </p:txBody>
-        </p:sp>
-      </p:grpSp>
-      <p:sp>
-        <p:nvSpPr>
-          <p:cNvPr id="23" name="TextBox 22"/>
-          <p:cNvSpPr txBox="1"/>
-          <p:nvPr/>
-        </p:nvSpPr>
-        <p:spPr>
-          <a:xfrm>
-            <a:off x="1448573" y="706714"/>
-            <a:ext cx="9294853" cy="584775"/>
-          </a:xfrm>
-          <a:prstGeom prst="rect">
-            <a:avLst/>
-          </a:prstGeom>
-          <a:noFill/>
-        </p:spPr>
-        <p:txBody>
-          <a:bodyPr wrap="none" rtlCol="0">
-            <a:spAutoFit/>
-          </a:bodyPr>
-          <a:lstStyle/>
-          <a:p>
-            <a:pPr algn="ctr"/>
-            <a:r>
-              <a:rPr lang="en-GB" sz="3200" dirty="0"/>
-              <a:t>ADO.NET Entity Framework </a:t>
-            </a:r>
-            <a:r>
-              <a:rPr lang="ru-RU" sz="3200" dirty="0"/>
-              <a:t>в составе .</a:t>
-            </a:r>
-            <a:r>
-              <a:rPr lang="en-GB" sz="3200" dirty="0"/>
-              <a:t>NET Framework</a:t>
-            </a:r>
           </a:p>
         </p:txBody>
       </p:sp>
@@ -4939,12 +8385,8 @@
           <a:lstStyle/>
           <a:p>
             <a:r>
-              <a:rPr lang="en-GB" dirty="0" smtClean="0"/>
-              <a:t>ADO.NET </a:t>
-            </a:r>
-            <a:r>
               <a:rPr lang="en-US" dirty="0" smtClean="0"/>
-              <a:t>Entity Framework</a:t>
+              <a:t>Model-View-Controller (MVC)</a:t>
             </a:r>
             <a:endParaRPr lang="en-GB" dirty="0"/>
           </a:p>
@@ -5008,11 +8450,11 @@
                   <a:srgbClr val="7030A0"/>
                 </a:solidFill>
               </a:rPr>
-              <a:t>Context </a:t>
+              <a:t>Controller</a:t>
             </a:r>
             <a:r>
               <a:rPr lang="en-US" dirty="0" smtClean="0"/>
-              <a:t>– </a:t>
+              <a:t> – </a:t>
             </a:r>
             <a:r>
               <a:rPr lang="ru-RU" dirty="0" smtClean="0"/>
@@ -5176,17 +8618,10 @@
           <a:lstStyle/>
           <a:p>
             <a:r>
-              <a:rPr lang="en-GB" dirty="0"/>
-              <a:t>ADO.NET Entity Framework </a:t>
-            </a:r>
-            <a:r>
-              <a:rPr lang="ru-RU" dirty="0"/>
-              <a:t>в составе .</a:t>
-            </a:r>
-            <a:r>
-              <a:rPr lang="en-GB" dirty="0"/>
-              <a:t>NET Framework</a:t>
-            </a:r>
+              <a:rPr lang="en-US" dirty="0" smtClean="0"/>
+              <a:t>View</a:t>
+            </a:r>
+            <a:endParaRPr lang="en-GB" dirty="0"/>
           </a:p>
         </p:txBody>
       </p:sp>
@@ -6248,7 +9683,7 @@
             <p:nvPr/>
           </p:nvPicPr>
           <p:blipFill>
-            <a:blip r:embed="rId2">
+            <a:blip r:embed="rId3">
               <a:extLst>
                 <a:ext uri="{28A0092B-C50C-407E-A947-70E740481C1C}">
                   <a14:useLocalDpi xmlns:a14="http://schemas.microsoft.com/office/drawing/2010/main" val="0"/>
@@ -6328,7 +9763,7 @@
             <p:nvPr/>
           </p:nvPicPr>
           <p:blipFill>
-            <a:blip r:embed="rId3">
+            <a:blip r:embed="rId4">
               <a:extLst>
                 <a:ext uri="{28A0092B-C50C-407E-A947-70E740481C1C}">
                   <a14:useLocalDpi xmlns:a14="http://schemas.microsoft.com/office/drawing/2010/main" val="0"/>

</xml_diff>

<commit_message>
modified the third predentation
</commit_message>
<xml_diff>
--- a/Presentations/Занятие 3.pptx
+++ b/Presentations/Занятие 3.pptx
@@ -245,7 +245,7 @@
           <a:p>
             <a:fld id="{5FC6800F-F77B-4E37-9455-C74E3CC59F23}" type="datetimeFigureOut">
               <a:rPr lang="en-GB" smtClean="0"/>
-              <a:t>24/03/2016</a:t>
+              <a:t>27/03/2016</a:t>
             </a:fld>
             <a:endParaRPr lang="en-GB"/>
           </a:p>
@@ -3687,12 +3687,12 @@
           <a:lstStyle/>
           <a:p>
             <a:r>
-              <a:rPr lang="ru-RU" smtClean="0"/>
+              <a:rPr lang="ru-RU" dirty="0" smtClean="0"/>
               <a:t>Занятие </a:t>
             </a:r>
             <a:r>
-              <a:rPr lang="ru-RU" smtClean="0"/>
-              <a:t>2</a:t>
+              <a:rPr lang="ru-RU" dirty="0" smtClean="0"/>
+              <a:t>3</a:t>
             </a:r>
             <a:endParaRPr lang="en-GB" dirty="0"/>
           </a:p>
@@ -3714,32 +3714,35 @@
           <a:lstStyle/>
           <a:p>
             <a:r>
+              <a:rPr lang="ru-RU" dirty="0"/>
+              <a:t>Веб-приложение на</a:t>
+            </a:r>
+            <a:r>
+              <a:rPr lang="en-US" dirty="0"/>
+              <a:t> </a:t>
+            </a:r>
+            <a:r>
+              <a:rPr lang="ru-RU" dirty="0"/>
+              <a:t>основе технологии </a:t>
+            </a:r>
+            <a:r>
+              <a:rPr lang="en-US" dirty="0"/>
+              <a:t>ASP.NET MVC</a:t>
+            </a:r>
+          </a:p>
+          <a:p>
+            <a:r>
               <a:rPr lang="ru-RU" dirty="0" smtClean="0"/>
-              <a:t>Разработка веб </a:t>
-            </a:r>
-            <a:r>
-              <a:rPr lang="ru-RU" dirty="0" err="1" smtClean="0"/>
-              <a:t>приложния</a:t>
+              <a:t>(</a:t>
+            </a:r>
+            <a:r>
+              <a:rPr lang="en-US" dirty="0" smtClean="0"/>
+              <a:t>MVC</a:t>
             </a:r>
             <a:r>
               <a:rPr lang="ru-RU" dirty="0" smtClean="0"/>
-              <a:t> на </a:t>
-            </a:r>
-            <a:r>
-              <a:rPr lang="en-US" dirty="0" smtClean="0"/>
-              <a:t>ASP.net </a:t>
-            </a:r>
-            <a:r>
-              <a:rPr lang="ru-RU" dirty="0" smtClean="0"/>
-              <a:t>и </a:t>
-            </a:r>
-            <a:r>
-              <a:rPr lang="en-US" dirty="0" smtClean="0"/>
-              <a:t>Oracle Database</a:t>
-            </a:r>
-          </a:p>
-          <a:p>
-            <a:endParaRPr lang="en-GB" dirty="0"/>
+              <a:t>)</a:t>
+            </a:r>
           </a:p>
         </p:txBody>
       </p:sp>
@@ -4096,44 +4099,6 @@
       </p:grpSpPr>
       <p:sp>
         <p:nvSpPr>
-          <p:cNvPr id="2" name="Заголовок 1"/>
-          <p:cNvSpPr>
-            <a:spLocks noGrp="1"/>
-          </p:cNvSpPr>
-          <p:nvPr>
-            <p:ph type="title"/>
-          </p:nvPr>
-        </p:nvSpPr>
-        <p:spPr/>
-        <p:txBody>
-          <a:bodyPr/>
-          <a:lstStyle/>
-          <a:p>
-            <a:endParaRPr lang="en-GB" dirty="0"/>
-          </a:p>
-        </p:txBody>
-      </p:sp>
-      <p:sp>
-        <p:nvSpPr>
-          <p:cNvPr id="3" name="Объект 2"/>
-          <p:cNvSpPr>
-            <a:spLocks noGrp="1"/>
-          </p:cNvSpPr>
-          <p:nvPr>
-            <p:ph idx="1"/>
-          </p:nvPr>
-        </p:nvSpPr>
-        <p:spPr/>
-        <p:txBody>
-          <a:bodyPr/>
-          <a:lstStyle/>
-          <a:p>
-            <a:endParaRPr lang="en-GB" dirty="0"/>
-          </a:p>
-        </p:txBody>
-      </p:sp>
-      <p:sp>
-        <p:nvSpPr>
           <p:cNvPr id="4" name="Дата 3"/>
           <p:cNvSpPr>
             <a:spLocks noGrp="1"/>
@@ -4237,13 +4202,206 @@
             <a:pPr algn="ctr"/>
             <a:r>
               <a:rPr lang="ru-RU" dirty="0" smtClean="0"/>
-              <a:t>Создание проекта </a:t>
-            </a:r>
-            <a:r>
-              <a:rPr lang="en-US" dirty="0" smtClean="0"/>
-              <a:t>ASP.NET</a:t>
+              <a:t>Обновление базы данных при изменении моделей</a:t>
             </a:r>
             <a:endParaRPr lang="en-GB" dirty="0"/>
+          </a:p>
+        </p:txBody>
+      </p:sp>
+      <p:sp>
+        <p:nvSpPr>
+          <p:cNvPr id="8" name="TextBox 7"/>
+          <p:cNvSpPr txBox="1"/>
+          <p:nvPr/>
+        </p:nvSpPr>
+        <p:spPr>
+          <a:xfrm>
+            <a:off x="838200" y="681642"/>
+            <a:ext cx="10515600" cy="1200329"/>
+          </a:xfrm>
+          <a:prstGeom prst="rect">
+            <a:avLst/>
+          </a:prstGeom>
+          <a:noFill/>
+        </p:spPr>
+        <p:txBody>
+          <a:bodyPr wrap="square" rtlCol="0">
+            <a:spAutoFit/>
+          </a:bodyPr>
+          <a:lstStyle/>
+          <a:p>
+            <a:r>
+              <a:rPr lang="ru-RU" sz="2400" dirty="0" smtClean="0"/>
+              <a:t>В ходе разработки вы не раз будете менять модели вашего приложения. При этом будет возникать исключительная ситуация из-за того, что структура базы данных не соответствует моделям</a:t>
+            </a:r>
+            <a:endParaRPr lang="en-GB" sz="2400" dirty="0"/>
+          </a:p>
+        </p:txBody>
+      </p:sp>
+      <p:pic>
+        <p:nvPicPr>
+          <p:cNvPr id="9" name="Рисунок 8"/>
+          <p:cNvPicPr>
+            <a:picLocks noChangeAspect="1"/>
+          </p:cNvPicPr>
+          <p:nvPr/>
+        </p:nvPicPr>
+        <p:blipFill>
+          <a:blip r:embed="rId3"/>
+          <a:stretch>
+            <a:fillRect/>
+          </a:stretch>
+        </p:blipFill>
+        <p:spPr>
+          <a:xfrm>
+            <a:off x="838200" y="2002539"/>
+            <a:ext cx="6950400" cy="2020821"/>
+          </a:xfrm>
+          <a:prstGeom prst="rect">
+            <a:avLst/>
+          </a:prstGeom>
+        </p:spPr>
+      </p:pic>
+      <p:sp>
+        <p:nvSpPr>
+          <p:cNvPr id="10" name="Прямоугольник 9"/>
+          <p:cNvSpPr/>
+          <p:nvPr/>
+        </p:nvSpPr>
+        <p:spPr>
+          <a:xfrm>
+            <a:off x="838200" y="4272742"/>
+            <a:ext cx="9935094" cy="299258"/>
+          </a:xfrm>
+          <a:prstGeom prst="rect">
+            <a:avLst/>
+          </a:prstGeom>
+        </p:spPr>
+        <p:style>
+          <a:lnRef idx="2">
+            <a:schemeClr val="accent6">
+              <a:shade val="50000"/>
+            </a:schemeClr>
+          </a:lnRef>
+          <a:fillRef idx="1">
+            <a:schemeClr val="accent6"/>
+          </a:fillRef>
+          <a:effectRef idx="0">
+            <a:schemeClr val="accent6"/>
+          </a:effectRef>
+          <a:fontRef idx="minor">
+            <a:schemeClr val="lt1"/>
+          </a:fontRef>
+        </p:style>
+        <p:txBody>
+          <a:bodyPr rtlCol="0" anchor="ctr"/>
+          <a:lstStyle/>
+          <a:p>
+            <a:pPr algn="ctr"/>
+            <a:endParaRPr lang="en-GB"/>
+          </a:p>
+        </p:txBody>
+      </p:sp>
+      <p:sp>
+        <p:nvSpPr>
+          <p:cNvPr id="11" name="TextBox 10"/>
+          <p:cNvSpPr txBox="1"/>
+          <p:nvPr/>
+        </p:nvSpPr>
+        <p:spPr>
+          <a:xfrm>
+            <a:off x="838199" y="4592369"/>
+            <a:ext cx="9935095" cy="830997"/>
+          </a:xfrm>
+          <a:prstGeom prst="rect">
+            <a:avLst/>
+          </a:prstGeom>
+        </p:spPr>
+        <p:style>
+          <a:lnRef idx="2">
+            <a:schemeClr val="accent6"/>
+          </a:lnRef>
+          <a:fillRef idx="1">
+            <a:schemeClr val="lt1"/>
+          </a:fillRef>
+          <a:effectRef idx="0">
+            <a:schemeClr val="accent6"/>
+          </a:effectRef>
+          <a:fontRef idx="minor">
+            <a:schemeClr val="dk1"/>
+          </a:fontRef>
+        </p:style>
+        <p:txBody>
+          <a:bodyPr wrap="square" rtlCol="0">
+            <a:spAutoFit/>
+          </a:bodyPr>
+          <a:lstStyle/>
+          <a:p>
+            <a:r>
+              <a:rPr lang="ru-RU" sz="2400" dirty="0" smtClean="0"/>
+              <a:t>Добавьте в файл </a:t>
+            </a:r>
+            <a:r>
+              <a:rPr lang="en-US" sz="2400" dirty="0" err="1" smtClean="0"/>
+              <a:t>Global.asax.cs</a:t>
+            </a:r>
+            <a:r>
+              <a:rPr lang="en-US" sz="2400" dirty="0" smtClean="0"/>
+              <a:t> </a:t>
+            </a:r>
+            <a:r>
+              <a:rPr lang="ru-RU" sz="2400" dirty="0" smtClean="0"/>
+              <a:t>в метод </a:t>
+            </a:r>
+            <a:r>
+              <a:rPr lang="en-GB" sz="2400" dirty="0" err="1" smtClean="0">
+                <a:solidFill>
+                  <a:srgbClr val="2B91AF"/>
+                </a:solidFill>
+                <a:highlight>
+                  <a:srgbClr val="FFFFFF"/>
+                </a:highlight>
+                <a:latin typeface="Consolas" panose="020B0609020204030204" pitchFamily="49" charset="0"/>
+              </a:rPr>
+              <a:t>MvcApplication.</a:t>
+            </a:r>
+            <a:r>
+              <a:rPr lang="en-GB" sz="2400" dirty="0" err="1" smtClean="0">
+                <a:solidFill>
+                  <a:srgbClr val="000000"/>
+                </a:solidFill>
+                <a:highlight>
+                  <a:srgbClr val="FFFFFF"/>
+                </a:highlight>
+                <a:latin typeface="Consolas" panose="020B0609020204030204" pitchFamily="49" charset="0"/>
+              </a:rPr>
+              <a:t>Application_Start</a:t>
+            </a:r>
+            <a:r>
+              <a:rPr lang="en-GB" sz="2400" dirty="0" smtClean="0">
+                <a:solidFill>
+                  <a:srgbClr val="000000"/>
+                </a:solidFill>
+                <a:highlight>
+                  <a:srgbClr val="FFFFFF"/>
+                </a:highlight>
+                <a:latin typeface="Consolas" panose="020B0609020204030204" pitchFamily="49" charset="0"/>
+              </a:rPr>
+              <a:t>() </a:t>
+            </a:r>
+            <a:r>
+              <a:rPr lang="ru-RU" sz="2400" dirty="0" smtClean="0">
+                <a:solidFill>
+                  <a:srgbClr val="000000"/>
+                </a:solidFill>
+                <a:highlight>
+                  <a:srgbClr val="FFFFFF"/>
+                </a:highlight>
+                <a:latin typeface="Consolas" panose="020B0609020204030204" pitchFamily="49" charset="0"/>
+              </a:rPr>
+              <a:t>строку:</a:t>
+            </a:r>
+            <a:endParaRPr lang="en-GB" sz="2400" dirty="0"/>
           </a:p>
         </p:txBody>
       </p:sp>
@@ -8240,7 +8398,11 @@
           <a:bodyPr/>
           <a:lstStyle/>
           <a:p>
-            <a:endParaRPr lang="en-GB"/>
+            <a:r>
+              <a:rPr lang="ru-RU" dirty="0" smtClean="0"/>
+              <a:t>Цель занятия</a:t>
+            </a:r>
+            <a:endParaRPr lang="en-GB" dirty="0"/>
           </a:p>
         </p:txBody>
       </p:sp>
@@ -8259,7 +8421,21 @@
           <a:bodyPr/>
           <a:lstStyle/>
           <a:p>
-            <a:endParaRPr lang="en-GB"/>
+            <a:r>
+              <a:rPr lang="ru-RU" dirty="0" smtClean="0"/>
+              <a:t>Познакомиться с архитектурой </a:t>
+            </a:r>
+            <a:r>
+              <a:rPr lang="en-US" dirty="0" smtClean="0"/>
+              <a:t>MVC</a:t>
+            </a:r>
+          </a:p>
+          <a:p>
+            <a:r>
+              <a:rPr lang="ru-RU" dirty="0" smtClean="0"/>
+              <a:t>Создать несколько моделей и котроллеров для приложения</a:t>
+            </a:r>
+            <a:endParaRPr lang="en-GB" dirty="0"/>
           </a:p>
         </p:txBody>
       </p:sp>

</xml_diff>